<commit_message>
getting ready for presentation
</commit_message>
<xml_diff>
--- a/ML-PROJECT.pptx
+++ b/ML-PROJECT.pptx
@@ -5,29 +5,30 @@
     <p:sldMasterId id="2147483648" r:id="rId4"/>
   </p:sldMasterIdLst>
   <p:notesMasterIdLst>
-    <p:notesMasterId r:id="rId22"/>
+    <p:notesMasterId r:id="rId23"/>
   </p:notesMasterIdLst>
   <p:handoutMasterIdLst>
-    <p:handoutMasterId r:id="rId23"/>
+    <p:handoutMasterId r:id="rId24"/>
   </p:handoutMasterIdLst>
   <p:sldIdLst>
     <p:sldId id="258" r:id="rId5"/>
     <p:sldId id="345" r:id="rId6"/>
     <p:sldId id="344" r:id="rId7"/>
-    <p:sldId id="291" r:id="rId8"/>
-    <p:sldId id="342" r:id="rId9"/>
-    <p:sldId id="346" r:id="rId10"/>
-    <p:sldId id="347" r:id="rId11"/>
-    <p:sldId id="348" r:id="rId12"/>
-    <p:sldId id="341" r:id="rId13"/>
-    <p:sldId id="294" r:id="rId14"/>
-    <p:sldId id="338" r:id="rId15"/>
-    <p:sldId id="337" r:id="rId16"/>
-    <p:sldId id="339" r:id="rId17"/>
+    <p:sldId id="350" r:id="rId8"/>
+    <p:sldId id="291" r:id="rId9"/>
+    <p:sldId id="342" r:id="rId10"/>
+    <p:sldId id="346" r:id="rId11"/>
+    <p:sldId id="347" r:id="rId12"/>
+    <p:sldId id="348" r:id="rId13"/>
+    <p:sldId id="341" r:id="rId14"/>
+    <p:sldId id="294" r:id="rId15"/>
+    <p:sldId id="338" r:id="rId16"/>
+    <p:sldId id="337" r:id="rId17"/>
     <p:sldId id="343" r:id="rId18"/>
-    <p:sldId id="299" r:id="rId19"/>
-    <p:sldId id="307" r:id="rId20"/>
-    <p:sldId id="267" r:id="rId21"/>
+    <p:sldId id="339" r:id="rId19"/>
+    <p:sldId id="349" r:id="rId20"/>
+    <p:sldId id="351" r:id="rId21"/>
+    <p:sldId id="267" r:id="rId22"/>
   </p:sldIdLst>
   <p:sldSz cx="9144000" cy="6858000" type="screen4x3"/>
   <p:notesSz cx="6858000" cy="9144000"/>
@@ -231,7 +232,7 @@
           <a:p>
             <a:fld id="{1C830E4C-56B7-2443-B370-610F8D1BCD9C}" type="datetimeFigureOut">
               <a:rPr lang="en-US" smtClean="0"/>
-              <a:t>4/5/2022</a:t>
+              <a:t>4/7/2022</a:t>
             </a:fld>
             <a:endParaRPr lang="en-US"/>
           </a:p>
@@ -408,7 +409,7 @@
           <a:p>
             <a:fld id="{CBCD2FD1-B169-9B41-A890-0ECD81C3476C}" type="datetimeFigureOut">
               <a:rPr lang="en-US" smtClean="0"/>
-              <a:t>4/5/2022</a:t>
+              <a:t>4/7/2022</a:t>
             </a:fld>
             <a:endParaRPr lang="en-US" dirty="0"/>
           </a:p>
@@ -791,7 +792,12 @@
             <p:ph type="sldImg"/>
           </p:nvPr>
         </p:nvSpPr>
-        <p:spPr/>
+        <p:spPr>
+          <a:xfrm>
+            <a:off x="1371600" y="1143000"/>
+            <a:ext cx="4114800" cy="3086100"/>
+          </a:xfrm>
+        </p:spPr>
       </p:sp>
       <p:sp>
         <p:nvSpPr>
@@ -829,96 +835,7 @@
           <a:p>
             <a:fld id="{769943EA-69D9-7E49-97CD-A49926F617C9}" type="slidenum">
               <a:rPr lang="en-US" smtClean="0"/>
-              <a:t>16</a:t>
-            </a:fld>
-            <a:endParaRPr lang="en-US" dirty="0"/>
-          </a:p>
-        </p:txBody>
-      </p:sp>
-    </p:spTree>
-    <p:extLst>
-      <p:ext uri="{BB962C8B-B14F-4D97-AF65-F5344CB8AC3E}">
-        <p14:creationId xmlns:p14="http://schemas.microsoft.com/office/powerpoint/2010/main" val="1171823856"/>
-      </p:ext>
-    </p:extLst>
-  </p:cSld>
-  <p:clrMapOvr>
-    <a:masterClrMapping/>
-  </p:clrMapOvr>
-</p:notes>
-</file>
-
-<file path=ppt/notesSlides/notesSlide3.xml><?xml version="1.0" encoding="utf-8"?>
-<p:notes xmlns:a="http://schemas.openxmlformats.org/drawingml/2006/main" xmlns:r="http://schemas.openxmlformats.org/officeDocument/2006/relationships" xmlns:p="http://schemas.openxmlformats.org/presentationml/2006/main">
-  <p:cSld>
-    <p:spTree>
-      <p:nvGrpSpPr>
-        <p:cNvPr id="1" name=""/>
-        <p:cNvGrpSpPr/>
-        <p:nvPr/>
-      </p:nvGrpSpPr>
-      <p:grpSpPr>
-        <a:xfrm>
-          <a:off x="0" y="0"/>
-          <a:ext cx="0" cy="0"/>
-          <a:chOff x="0" y="0"/>
-          <a:chExt cx="0" cy="0"/>
-        </a:xfrm>
-      </p:grpSpPr>
-      <p:sp>
-        <p:nvSpPr>
-          <p:cNvPr id="2" name="Slide Image Placeholder 1"/>
-          <p:cNvSpPr>
-            <a:spLocks noGrp="1" noRot="1" noChangeAspect="1"/>
-          </p:cNvSpPr>
-          <p:nvPr>
-            <p:ph type="sldImg"/>
-          </p:nvPr>
-        </p:nvSpPr>
-        <p:spPr>
-          <a:xfrm>
-            <a:off x="1371600" y="1143000"/>
-            <a:ext cx="4114800" cy="3086100"/>
-          </a:xfrm>
-        </p:spPr>
-      </p:sp>
-      <p:sp>
-        <p:nvSpPr>
-          <p:cNvPr id="3" name="Notes Placeholder 2"/>
-          <p:cNvSpPr>
-            <a:spLocks noGrp="1"/>
-          </p:cNvSpPr>
-          <p:nvPr>
-            <p:ph type="body" idx="1"/>
-          </p:nvPr>
-        </p:nvSpPr>
-        <p:spPr/>
-        <p:txBody>
-          <a:bodyPr/>
-          <a:lstStyle/>
-          <a:p>
-            <a:endParaRPr lang="en-US" dirty="0"/>
-          </a:p>
-        </p:txBody>
-      </p:sp>
-      <p:sp>
-        <p:nvSpPr>
-          <p:cNvPr id="4" name="Slide Number Placeholder 3"/>
-          <p:cNvSpPr>
-            <a:spLocks noGrp="1"/>
-          </p:cNvSpPr>
-          <p:nvPr>
-            <p:ph type="sldNum" sz="quarter" idx="5"/>
-          </p:nvPr>
-        </p:nvSpPr>
-        <p:spPr/>
-        <p:txBody>
-          <a:bodyPr/>
-          <a:lstStyle/>
-          <a:p>
-            <a:fld id="{769943EA-69D9-7E49-97CD-A49926F617C9}" type="slidenum">
-              <a:rPr lang="en-US" smtClean="0"/>
-              <a:t>17</a:t>
+              <a:t>18</a:t>
             </a:fld>
             <a:endParaRPr lang="en-US" dirty="0"/>
           </a:p>
@@ -21025,7 +20942,7 @@
           <a:p>
             <a:r>
               <a:rPr lang="en-US" dirty="0"/>
-              <a:t>Evan Bradley</a:t>
+              <a:t>Evan Bradley – Group 7</a:t>
             </a:r>
           </a:p>
         </p:txBody>
@@ -21095,10 +21012,10 @@
       </p:grpSpPr>
       <p:sp>
         <p:nvSpPr>
-          <p:cNvPr id="5" name="Title 4">
-            <a:extLst>
-              <a:ext uri="{FF2B5EF4-FFF2-40B4-BE49-F238E27FC236}">
-                <a16:creationId xmlns:a16="http://schemas.microsoft.com/office/drawing/2014/main" id="{8E864A94-2733-4500-9289-9518C7EA1563}"/>
+          <p:cNvPr id="2" name="Title 1">
+            <a:extLst>
+              <a:ext uri="{FF2B5EF4-FFF2-40B4-BE49-F238E27FC236}">
+                <a16:creationId xmlns:a16="http://schemas.microsoft.com/office/drawing/2014/main" id="{7935CBB2-F610-40B4-A124-363EF63EBDD4}"/>
               </a:ext>
             </a:extLst>
           </p:cNvPr>
@@ -21111,8 +21028,41 @@
         </p:nvSpPr>
         <p:spPr>
           <a:xfrm>
-            <a:off x="714375" y="365126"/>
-            <a:ext cx="3940879" cy="1331865"/>
+            <a:off x="714375" y="526778"/>
+            <a:ext cx="7715251" cy="869089"/>
+          </a:xfrm>
+        </p:spPr>
+        <p:txBody>
+          <a:bodyPr/>
+          <a:lstStyle/>
+          <a:p>
+            <a:r>
+              <a:rPr lang="en-US" dirty="0"/>
+              <a:t>Testing / Validation plan</a:t>
+            </a:r>
+          </a:p>
+        </p:txBody>
+      </p:sp>
+      <p:sp>
+        <p:nvSpPr>
+          <p:cNvPr id="3" name="Content Placeholder 2">
+            <a:extLst>
+              <a:ext uri="{FF2B5EF4-FFF2-40B4-BE49-F238E27FC236}">
+                <a16:creationId xmlns:a16="http://schemas.microsoft.com/office/drawing/2014/main" id="{9113FCDE-F6D7-41FF-9845-D3893750EB08}"/>
+              </a:ext>
+            </a:extLst>
+          </p:cNvPr>
+          <p:cNvSpPr>
+            <a:spLocks noGrp="1"/>
+          </p:cNvSpPr>
+          <p:nvPr>
+            <p:ph idx="10"/>
+          </p:nvPr>
+        </p:nvSpPr>
+        <p:spPr>
+          <a:xfrm>
+            <a:off x="714374" y="1686758"/>
+            <a:ext cx="7688645" cy="4256843"/>
           </a:xfrm>
         </p:spPr>
         <p:txBody>
@@ -21122,170 +21072,88 @@
           <a:lstStyle/>
           <a:p>
             <a:r>
-              <a:rPr lang="en-US" dirty="0"/>
-              <a:t>RNN Approach</a:t>
-            </a:r>
-          </a:p>
-        </p:txBody>
-      </p:sp>
-      <p:sp>
-        <p:nvSpPr>
-          <p:cNvPr id="6" name="Content Placeholder 5">
-            <a:extLst>
-              <a:ext uri="{FF2B5EF4-FFF2-40B4-BE49-F238E27FC236}">
-                <a16:creationId xmlns:a16="http://schemas.microsoft.com/office/drawing/2014/main" id="{EBF853B9-354A-4F68-BCD2-DAB8430A1118}"/>
-              </a:ext>
-            </a:extLst>
-          </p:cNvPr>
-          <p:cNvSpPr>
-            <a:spLocks noGrp="1"/>
-          </p:cNvSpPr>
-          <p:nvPr>
-            <p:ph idx="1"/>
-          </p:nvPr>
-        </p:nvSpPr>
-        <p:spPr>
-          <a:xfrm>
-            <a:off x="714374" y="1962386"/>
-            <a:ext cx="3949838" cy="3981214"/>
-          </a:xfrm>
-        </p:spPr>
-        <p:txBody>
-          <a:bodyPr>
-            <a:normAutofit/>
-          </a:bodyPr>
-          <a:lstStyle/>
-          <a:p>
-            <a:r>
               <a:rPr lang="en-US" sz="2000" dirty="0"/>
-              <a:t>Item one</a:t>
-            </a:r>
-          </a:p>
-          <a:p>
+              <a:t>Using the </a:t>
+            </a:r>
+            <a:r>
+              <a:rPr lang="en-US" sz="2000" dirty="0" err="1"/>
+              <a:t>sklearn</a:t>
+            </a:r>
             <a:r>
               <a:rPr lang="en-US" sz="2000" dirty="0"/>
-              <a:t>Item two</a:t>
-            </a:r>
-          </a:p>
-          <a:p>
+              <a:t> </a:t>
+            </a:r>
+            <a:r>
+              <a:rPr lang="en-US" sz="2000" dirty="0" err="1"/>
+              <a:t>train_test_split</a:t>
+            </a:r>
             <a:r>
               <a:rPr lang="en-US" sz="2000" dirty="0"/>
-              <a:t>Item three</a:t>
+              <a:t> function the data was first split into test/train data with a split of 80% train, 20% test.</a:t>
+            </a:r>
+          </a:p>
+          <a:p>
+            <a:r>
+              <a:rPr lang="en-US" sz="2000" dirty="0"/>
+              <a:t>The </a:t>
+            </a:r>
+            <a:r>
+              <a:rPr lang="en-US" sz="2000" dirty="0" err="1"/>
+              <a:t>train_test_split</a:t>
+            </a:r>
+            <a:r>
+              <a:rPr lang="en-US" sz="2000" dirty="0"/>
+              <a:t> function was then used again on the train data to generate validation data with a split of 80% train, 20% validation</a:t>
+            </a:r>
+          </a:p>
+          <a:p>
+            <a:r>
+              <a:rPr lang="en-US" sz="2000" dirty="0"/>
+              <a:t>Validation data was used to evaluate performance during training, test data was used to evaluate the model after training was </a:t>
+            </a:r>
+            <a:r>
+              <a:rPr lang="en-US" sz="2000" dirty="0" err="1"/>
+              <a:t>comlpete</a:t>
+            </a:r>
+            <a:endParaRPr lang="en-US" sz="2000" dirty="0"/>
+          </a:p>
+          <a:p>
+            <a:r>
+              <a:rPr lang="en-US" sz="2000" dirty="0"/>
+              <a:t>This resulted in a split of</a:t>
             </a:r>
           </a:p>
           <a:p>
             <a:pPr lvl="1"/>
             <a:r>
-              <a:rPr lang="en-US" dirty="0"/>
-              <a:t>Sub item one</a:t>
+              <a:rPr lang="en-US" sz="1600" dirty="0"/>
+              <a:t>64% training data</a:t>
             </a:r>
           </a:p>
           <a:p>
             <a:pPr lvl="1"/>
             <a:r>
-              <a:rPr lang="en-US" dirty="0"/>
-              <a:t>Sub item two</a:t>
-            </a:r>
-          </a:p>
-          <a:p>
-            <a:r>
-              <a:rPr lang="en-US" sz="2000" dirty="0"/>
-              <a:t>Item four</a:t>
-            </a:r>
-          </a:p>
-          <a:p>
-            <a:endParaRPr lang="en-US" sz="2000" dirty="0"/>
-          </a:p>
-        </p:txBody>
-      </p:sp>
-      <p:pic>
-        <p:nvPicPr>
-          <p:cNvPr id="21" name="Picture Placeholder 20" descr="Two students sitting on the steps with Old Capitol in the background">
-            <a:extLst>
-              <a:ext uri="{FF2B5EF4-FFF2-40B4-BE49-F238E27FC236}">
-                <a16:creationId xmlns:a16="http://schemas.microsoft.com/office/drawing/2014/main" id="{1DE844F3-CB05-9141-815E-4BDE61AA343C}"/>
-              </a:ext>
-            </a:extLst>
-          </p:cNvPr>
-          <p:cNvPicPr>
-            <a:picLocks noGrp="1" noChangeAspect="1"/>
-          </p:cNvPicPr>
-          <p:nvPr>
-            <p:ph type="pic" sz="quarter" idx="14"/>
-          </p:nvPr>
-        </p:nvPicPr>
-        <p:blipFill rotWithShape="1">
-          <a:blip r:embed="rId2"/>
-          <a:srcRect l="6194" r="6194"/>
-          <a:stretch/>
-        </p:blipFill>
-        <p:spPr>
-          <a:xfrm>
-            <a:off x="5369627" y="1"/>
-            <a:ext cx="1862553" cy="3191425"/>
-          </a:xfrm>
-        </p:spPr>
-      </p:pic>
-      <p:pic>
-        <p:nvPicPr>
-          <p:cNvPr id="26" name="Picture Placeholder 25" descr="The Brain Rock sculpture on T. Anne Cleary Walkway">
-            <a:extLst>
-              <a:ext uri="{FF2B5EF4-FFF2-40B4-BE49-F238E27FC236}">
-                <a16:creationId xmlns:a16="http://schemas.microsoft.com/office/drawing/2014/main" id="{F2FE15C4-FB15-5743-B3D1-00163AE61067}"/>
-              </a:ext>
-            </a:extLst>
-          </p:cNvPr>
-          <p:cNvPicPr>
-            <a:picLocks noGrp="1" noChangeAspect="1"/>
-          </p:cNvPicPr>
-          <p:nvPr>
-            <p:ph type="pic" sz="quarter" idx="15"/>
-          </p:nvPr>
-        </p:nvPicPr>
-        <p:blipFill rotWithShape="1">
-          <a:blip r:embed="rId3"/>
-          <a:srcRect l="6231" r="6231"/>
-          <a:stretch/>
-        </p:blipFill>
-        <p:spPr>
-          <a:xfrm>
-            <a:off x="7285223" y="1"/>
-            <a:ext cx="1862553" cy="3191425"/>
-          </a:xfrm>
-        </p:spPr>
-      </p:pic>
-      <p:pic>
-        <p:nvPicPr>
-          <p:cNvPr id="31" name="Picture Placeholder 30" descr="A group of flags on a bridge in front of a group of buildings">
-            <a:extLst>
-              <a:ext uri="{FF2B5EF4-FFF2-40B4-BE49-F238E27FC236}">
-                <a16:creationId xmlns:a16="http://schemas.microsoft.com/office/drawing/2014/main" id="{BB382611-BC45-6546-BA62-D32A0ABC4545}"/>
-              </a:ext>
-            </a:extLst>
-          </p:cNvPr>
-          <p:cNvPicPr>
-            <a:picLocks noGrp="1" noChangeAspect="1"/>
-          </p:cNvPicPr>
-          <p:nvPr>
-            <p:ph type="pic" sz="quarter" idx="11"/>
-          </p:nvPr>
-        </p:nvPicPr>
-        <p:blipFill rotWithShape="1">
-          <a:blip r:embed="rId4"/>
-          <a:srcRect l="5648" r="5648"/>
-          <a:stretch/>
-        </p:blipFill>
-        <p:spPr>
-          <a:xfrm>
-            <a:off x="5369627" y="3234551"/>
-            <a:ext cx="3774374" cy="3163824"/>
-          </a:xfrm>
-        </p:spPr>
-      </p:pic>
+              <a:rPr lang="en-US" sz="1600" dirty="0"/>
+              <a:t>20% testing data</a:t>
+            </a:r>
+          </a:p>
+          <a:p>
+            <a:pPr lvl="1"/>
+            <a:r>
+              <a:rPr lang="en-US" sz="1600" dirty="0"/>
+              <a:t>16% validation data</a:t>
+            </a:r>
+          </a:p>
+          <a:p>
+            <a:pPr lvl="1"/>
+            <a:endParaRPr lang="en-US" sz="1600" dirty="0"/>
+          </a:p>
+        </p:txBody>
+      </p:sp>
     </p:spTree>
     <p:extLst>
       <p:ext uri="{BB962C8B-B14F-4D97-AF65-F5344CB8AC3E}">
-        <p14:creationId xmlns:p14="http://schemas.microsoft.com/office/powerpoint/2010/main" val="3355918015"/>
+        <p14:creationId xmlns:p14="http://schemas.microsoft.com/office/powerpoint/2010/main" val="3743522566"/>
       </p:ext>
     </p:extLst>
   </p:cSld>
@@ -21314,10 +21182,10 @@
       </p:grpSpPr>
       <p:sp>
         <p:nvSpPr>
-          <p:cNvPr id="2" name="Title 1">
-            <a:extLst>
-              <a:ext uri="{FF2B5EF4-FFF2-40B4-BE49-F238E27FC236}">
-                <a16:creationId xmlns:a16="http://schemas.microsoft.com/office/drawing/2014/main" id="{B7A6897B-2E43-4F3E-8A5E-70160054A051}"/>
+          <p:cNvPr id="5" name="Title 4">
+            <a:extLst>
+              <a:ext uri="{FF2B5EF4-FFF2-40B4-BE49-F238E27FC236}">
+                <a16:creationId xmlns:a16="http://schemas.microsoft.com/office/drawing/2014/main" id="{8E864A94-2733-4500-9289-9518C7EA1563}"/>
               </a:ext>
             </a:extLst>
           </p:cNvPr>
@@ -21328,103 +21196,29 @@
             <p:ph type="title"/>
           </p:nvPr>
         </p:nvSpPr>
-        <p:spPr/>
-        <p:txBody>
-          <a:bodyPr/>
-          <a:lstStyle/>
-          <a:p>
-            <a:r>
-              <a:rPr lang="en-US" dirty="0"/>
-              <a:t>RNN Results</a:t>
-            </a:r>
-          </a:p>
-        </p:txBody>
-      </p:sp>
-      <p:sp>
-        <p:nvSpPr>
-          <p:cNvPr id="3" name="Content Placeholder 2">
-            <a:extLst>
-              <a:ext uri="{FF2B5EF4-FFF2-40B4-BE49-F238E27FC236}">
-                <a16:creationId xmlns:a16="http://schemas.microsoft.com/office/drawing/2014/main" id="{244BFBBB-BBCF-41C8-AC7A-F130AF4CB359}"/>
-              </a:ext>
-            </a:extLst>
-          </p:cNvPr>
-          <p:cNvSpPr>
-            <a:spLocks noGrp="1"/>
-          </p:cNvSpPr>
-          <p:nvPr>
-            <p:ph idx="1"/>
-          </p:nvPr>
-        </p:nvSpPr>
-        <p:spPr/>
+        <p:spPr>
+          <a:xfrm>
+            <a:off x="714375" y="365126"/>
+            <a:ext cx="3940879" cy="1331865"/>
+          </a:xfrm>
+        </p:spPr>
         <p:txBody>
           <a:bodyPr>
             <a:normAutofit/>
           </a:bodyPr>
           <a:lstStyle/>
           <a:p>
-            <a:endParaRPr lang="en-US" sz="2000" dirty="0"/>
-          </a:p>
-        </p:txBody>
-      </p:sp>
-      <p:sp>
-        <p:nvSpPr>
-          <p:cNvPr id="4" name="Picture Placeholder 3">
-            <a:extLst>
-              <a:ext uri="{FF2B5EF4-FFF2-40B4-BE49-F238E27FC236}">
-                <a16:creationId xmlns:a16="http://schemas.microsoft.com/office/drawing/2014/main" id="{2E982278-3B84-4A3E-AF83-CBD3F0B16BD2}"/>
-              </a:ext>
-            </a:extLst>
-          </p:cNvPr>
-          <p:cNvSpPr>
-            <a:spLocks noGrp="1"/>
-          </p:cNvSpPr>
-          <p:nvPr>
-            <p:ph type="pic" sz="quarter" idx="14"/>
-          </p:nvPr>
-        </p:nvSpPr>
-        <p:spPr/>
-      </p:sp>
-      <p:sp>
-        <p:nvSpPr>
-          <p:cNvPr id="5" name="Picture Placeholder 4">
-            <a:extLst>
-              <a:ext uri="{FF2B5EF4-FFF2-40B4-BE49-F238E27FC236}">
-                <a16:creationId xmlns:a16="http://schemas.microsoft.com/office/drawing/2014/main" id="{5895601C-42E0-4964-805F-BA9F08FADDF8}"/>
-              </a:ext>
-            </a:extLst>
-          </p:cNvPr>
-          <p:cNvSpPr>
-            <a:spLocks noGrp="1"/>
-          </p:cNvSpPr>
-          <p:nvPr>
-            <p:ph type="pic" sz="quarter" idx="15"/>
-          </p:nvPr>
-        </p:nvSpPr>
-        <p:spPr/>
-      </p:sp>
-      <p:sp>
-        <p:nvSpPr>
-          <p:cNvPr id="6" name="Picture Placeholder 5">
-            <a:extLst>
-              <a:ext uri="{FF2B5EF4-FFF2-40B4-BE49-F238E27FC236}">
-                <a16:creationId xmlns:a16="http://schemas.microsoft.com/office/drawing/2014/main" id="{63AB1608-11A1-45F3-833C-A15FC69DF93D}"/>
-              </a:ext>
-            </a:extLst>
-          </p:cNvPr>
-          <p:cNvSpPr>
-            <a:spLocks noGrp="1"/>
-          </p:cNvSpPr>
-          <p:nvPr>
-            <p:ph type="pic" sz="quarter" idx="11"/>
-          </p:nvPr>
-        </p:nvSpPr>
-        <p:spPr/>
+            <a:r>
+              <a:rPr lang="en-US" dirty="0"/>
+              <a:t>RNN Approach</a:t>
+            </a:r>
+          </a:p>
+        </p:txBody>
       </p:sp>
     </p:spTree>
     <p:extLst>
       <p:ext uri="{BB962C8B-B14F-4D97-AF65-F5344CB8AC3E}">
-        <p14:creationId xmlns:p14="http://schemas.microsoft.com/office/powerpoint/2010/main" val="1898018329"/>
+        <p14:creationId xmlns:p14="http://schemas.microsoft.com/office/powerpoint/2010/main" val="3355918015"/>
       </p:ext>
     </p:extLst>
   </p:cSld>
@@ -21453,10 +21247,10 @@
       </p:grpSpPr>
       <p:sp>
         <p:nvSpPr>
-          <p:cNvPr id="5" name="Title 4">
-            <a:extLst>
-              <a:ext uri="{FF2B5EF4-FFF2-40B4-BE49-F238E27FC236}">
-                <a16:creationId xmlns:a16="http://schemas.microsoft.com/office/drawing/2014/main" id="{8E864A94-2733-4500-9289-9518C7EA1563}"/>
+          <p:cNvPr id="2" name="Title 1">
+            <a:extLst>
+              <a:ext uri="{FF2B5EF4-FFF2-40B4-BE49-F238E27FC236}">
+                <a16:creationId xmlns:a16="http://schemas.microsoft.com/office/drawing/2014/main" id="{B7A6897B-2E43-4F3E-8A5E-70160054A051}"/>
               </a:ext>
             </a:extLst>
           </p:cNvPr>
@@ -21470,180 +21264,84 @@
         <p:spPr>
           <a:xfrm>
             <a:off x="714375" y="365126"/>
-            <a:ext cx="3940879" cy="1331865"/>
-          </a:xfrm>
-        </p:spPr>
-        <p:txBody>
-          <a:bodyPr>
-            <a:normAutofit/>
-          </a:bodyPr>
+            <a:ext cx="8260660" cy="1331865"/>
+          </a:xfrm>
+        </p:spPr>
+        <p:txBody>
+          <a:bodyPr/>
           <a:lstStyle/>
           <a:p>
             <a:r>
               <a:rPr lang="en-US" dirty="0"/>
-              <a:t>LSTM Approach</a:t>
-            </a:r>
-          </a:p>
-        </p:txBody>
-      </p:sp>
-      <p:sp>
-        <p:nvSpPr>
-          <p:cNvPr id="6" name="Content Placeholder 5">
-            <a:extLst>
-              <a:ext uri="{FF2B5EF4-FFF2-40B4-BE49-F238E27FC236}">
-                <a16:creationId xmlns:a16="http://schemas.microsoft.com/office/drawing/2014/main" id="{EBF853B9-354A-4F68-BCD2-DAB8430A1118}"/>
-              </a:ext>
-            </a:extLst>
-          </p:cNvPr>
-          <p:cNvSpPr>
-            <a:spLocks noGrp="1"/>
-          </p:cNvSpPr>
-          <p:nvPr>
-            <p:ph idx="1"/>
-          </p:nvPr>
-        </p:nvSpPr>
-        <p:spPr>
-          <a:xfrm>
-            <a:off x="714374" y="1962386"/>
-            <a:ext cx="3949838" cy="3981214"/>
-          </a:xfrm>
-        </p:spPr>
-        <p:txBody>
-          <a:bodyPr>
-            <a:normAutofit/>
-          </a:bodyPr>
-          <a:lstStyle/>
-          <a:p>
-            <a:r>
-              <a:rPr lang="en-US" sz="2000" dirty="0"/>
-              <a:t>Item one</a:t>
-            </a:r>
-          </a:p>
-          <a:p>
-            <a:r>
-              <a:rPr lang="en-US" sz="2000" dirty="0"/>
-              <a:t>Item two</a:t>
-            </a:r>
-          </a:p>
-          <a:p>
-            <a:r>
-              <a:rPr lang="en-US" sz="2000" dirty="0"/>
-              <a:t>Item three</a:t>
-            </a:r>
-          </a:p>
-          <a:p>
-            <a:pPr lvl="1"/>
-            <a:r>
-              <a:rPr lang="en-US" dirty="0"/>
-              <a:t>Sub item one</a:t>
-            </a:r>
-          </a:p>
-          <a:p>
-            <a:pPr lvl="1"/>
-            <a:r>
-              <a:rPr lang="en-US" dirty="0"/>
-              <a:t>Sub item two</a:t>
-            </a:r>
-          </a:p>
-          <a:p>
-            <a:r>
-              <a:rPr lang="en-US" sz="2000" dirty="0"/>
-              <a:t>Item four</a:t>
-            </a:r>
-          </a:p>
-          <a:p>
-            <a:endParaRPr lang="en-US" sz="2000" dirty="0"/>
+              <a:t>RNN Results – Predicting Temperature</a:t>
+            </a:r>
           </a:p>
         </p:txBody>
       </p:sp>
       <p:pic>
         <p:nvPicPr>
-          <p:cNvPr id="21" name="Picture Placeholder 20" descr="Two students sitting on the steps with Old Capitol in the background">
-            <a:extLst>
-              <a:ext uri="{FF2B5EF4-FFF2-40B4-BE49-F238E27FC236}">
-                <a16:creationId xmlns:a16="http://schemas.microsoft.com/office/drawing/2014/main" id="{1DE844F3-CB05-9141-815E-4BDE61AA343C}"/>
+          <p:cNvPr id="8" name="Picture 7">
+            <a:extLst>
+              <a:ext uri="{FF2B5EF4-FFF2-40B4-BE49-F238E27FC236}">
+                <a16:creationId xmlns:a16="http://schemas.microsoft.com/office/drawing/2014/main" id="{77CED14E-8EA5-4F62-B728-852EF8771545}"/>
               </a:ext>
             </a:extLst>
           </p:cNvPr>
           <p:cNvPicPr>
-            <a:picLocks noGrp="1" noChangeAspect="1"/>
+            <a:picLocks noChangeAspect="1"/>
           </p:cNvPicPr>
-          <p:nvPr>
-            <p:ph type="pic" sz="quarter" idx="14"/>
-          </p:nvPr>
+          <p:nvPr/>
         </p:nvPicPr>
-        <p:blipFill rotWithShape="1">
+        <p:blipFill>
           <a:blip r:embed="rId2"/>
-          <a:srcRect l="6194" r="6194"/>
-          <a:stretch/>
+          <a:stretch>
+            <a:fillRect/>
+          </a:stretch>
         </p:blipFill>
         <p:spPr>
           <a:xfrm>
-            <a:off x="5369627" y="1"/>
-            <a:ext cx="1862553" cy="3191425"/>
-          </a:xfrm>
+            <a:off x="453798" y="2701426"/>
+            <a:ext cx="3533775" cy="2447925"/>
+          </a:xfrm>
+          <a:prstGeom prst="rect">
+            <a:avLst/>
+          </a:prstGeom>
         </p:spPr>
       </p:pic>
       <p:pic>
         <p:nvPicPr>
-          <p:cNvPr id="26" name="Picture Placeholder 25" descr="The Brain Rock sculpture on T. Anne Cleary Walkway">
-            <a:extLst>
-              <a:ext uri="{FF2B5EF4-FFF2-40B4-BE49-F238E27FC236}">
-                <a16:creationId xmlns:a16="http://schemas.microsoft.com/office/drawing/2014/main" id="{F2FE15C4-FB15-5743-B3D1-00163AE61067}"/>
+          <p:cNvPr id="10" name="Picture 9">
+            <a:extLst>
+              <a:ext uri="{FF2B5EF4-FFF2-40B4-BE49-F238E27FC236}">
+                <a16:creationId xmlns:a16="http://schemas.microsoft.com/office/drawing/2014/main" id="{5D8BA04C-05B9-45AC-8410-8808157C2E83}"/>
               </a:ext>
             </a:extLst>
           </p:cNvPr>
           <p:cNvPicPr>
-            <a:picLocks noGrp="1" noChangeAspect="1"/>
+            <a:picLocks noChangeAspect="1"/>
           </p:cNvPicPr>
-          <p:nvPr>
-            <p:ph type="pic" sz="quarter" idx="15"/>
-          </p:nvPr>
+          <p:nvPr/>
         </p:nvPicPr>
-        <p:blipFill rotWithShape="1">
+        <p:blipFill>
           <a:blip r:embed="rId3"/>
-          <a:srcRect l="6231" r="6231"/>
-          <a:stretch/>
+          <a:stretch>
+            <a:fillRect/>
+          </a:stretch>
         </p:blipFill>
         <p:spPr>
           <a:xfrm>
-            <a:off x="7285223" y="1"/>
-            <a:ext cx="1862553" cy="3191425"/>
-          </a:xfrm>
-        </p:spPr>
-      </p:pic>
-      <p:pic>
-        <p:nvPicPr>
-          <p:cNvPr id="31" name="Picture Placeholder 30" descr="A group of flags on a bridge in front of a group of buildings">
-            <a:extLst>
-              <a:ext uri="{FF2B5EF4-FFF2-40B4-BE49-F238E27FC236}">
-                <a16:creationId xmlns:a16="http://schemas.microsoft.com/office/drawing/2014/main" id="{BB382611-BC45-6546-BA62-D32A0ABC4545}"/>
-              </a:ext>
-            </a:extLst>
-          </p:cNvPr>
-          <p:cNvPicPr>
-            <a:picLocks noGrp="1" noChangeAspect="1"/>
-          </p:cNvPicPr>
-          <p:nvPr>
-            <p:ph type="pic" sz="quarter" idx="11"/>
-          </p:nvPr>
-        </p:nvPicPr>
-        <p:blipFill rotWithShape="1">
-          <a:blip r:embed="rId4"/>
-          <a:srcRect l="5648" r="5648"/>
-          <a:stretch/>
-        </p:blipFill>
-        <p:spPr>
-          <a:xfrm>
-            <a:off x="5369627" y="3234551"/>
-            <a:ext cx="3774374" cy="3163824"/>
-          </a:xfrm>
+            <a:off x="5156429" y="2806201"/>
+            <a:ext cx="3524250" cy="2343150"/>
+          </a:xfrm>
+          <a:prstGeom prst="rect">
+            <a:avLst/>
+          </a:prstGeom>
         </p:spPr>
       </p:pic>
     </p:spTree>
     <p:extLst>
       <p:ext uri="{BB962C8B-B14F-4D97-AF65-F5344CB8AC3E}">
-        <p14:creationId xmlns:p14="http://schemas.microsoft.com/office/powerpoint/2010/main" val="1467696293"/>
+        <p14:creationId xmlns:p14="http://schemas.microsoft.com/office/powerpoint/2010/main" val="1898018329"/>
       </p:ext>
     </p:extLst>
   </p:cSld>
@@ -21689,7 +21387,7 @@
         <p:spPr>
           <a:xfrm>
             <a:off x="714375" y="365126"/>
-            <a:ext cx="3940879" cy="1331865"/>
+            <a:ext cx="8101634" cy="1331865"/>
           </a:xfrm>
         </p:spPr>
         <p:txBody>
@@ -21700,169 +21398,15 @@
           <a:p>
             <a:r>
               <a:rPr lang="en-US" dirty="0"/>
-              <a:t>LSTM Results</a:t>
-            </a:r>
-          </a:p>
-        </p:txBody>
-      </p:sp>
-      <p:sp>
-        <p:nvSpPr>
-          <p:cNvPr id="6" name="Content Placeholder 5">
-            <a:extLst>
-              <a:ext uri="{FF2B5EF4-FFF2-40B4-BE49-F238E27FC236}">
-                <a16:creationId xmlns:a16="http://schemas.microsoft.com/office/drawing/2014/main" id="{EBF853B9-354A-4F68-BCD2-DAB8430A1118}"/>
-              </a:ext>
-            </a:extLst>
-          </p:cNvPr>
-          <p:cNvSpPr>
-            <a:spLocks noGrp="1"/>
-          </p:cNvSpPr>
-          <p:nvPr>
-            <p:ph idx="1"/>
-          </p:nvPr>
-        </p:nvSpPr>
-        <p:spPr>
-          <a:xfrm>
-            <a:off x="714374" y="1962386"/>
-            <a:ext cx="3949838" cy="3981214"/>
-          </a:xfrm>
-        </p:spPr>
-        <p:txBody>
-          <a:bodyPr>
-            <a:normAutofit/>
-          </a:bodyPr>
-          <a:lstStyle/>
-          <a:p>
-            <a:r>
-              <a:rPr lang="en-US" sz="2000" dirty="0"/>
-              <a:t>Item one</a:t>
-            </a:r>
-          </a:p>
-          <a:p>
-            <a:r>
-              <a:rPr lang="en-US" sz="2000" dirty="0"/>
-              <a:t>Item two</a:t>
-            </a:r>
-          </a:p>
-          <a:p>
-            <a:r>
-              <a:rPr lang="en-US" sz="2000" dirty="0"/>
-              <a:t>Item three</a:t>
-            </a:r>
-          </a:p>
-          <a:p>
-            <a:pPr lvl="1"/>
-            <a:r>
-              <a:rPr lang="en-US" dirty="0"/>
-              <a:t>Sub item one</a:t>
-            </a:r>
-          </a:p>
-          <a:p>
-            <a:pPr lvl="1"/>
-            <a:r>
-              <a:rPr lang="en-US" dirty="0"/>
-              <a:t>Sub item two</a:t>
-            </a:r>
-          </a:p>
-          <a:p>
-            <a:r>
-              <a:rPr lang="en-US" sz="2000" dirty="0"/>
-              <a:t>Item four</a:t>
-            </a:r>
-          </a:p>
-          <a:p>
-            <a:endParaRPr lang="en-US" sz="2000" dirty="0"/>
-          </a:p>
-        </p:txBody>
-      </p:sp>
-      <p:pic>
-        <p:nvPicPr>
-          <p:cNvPr id="21" name="Picture Placeholder 20" descr="Two students sitting on the steps with Old Capitol in the background">
-            <a:extLst>
-              <a:ext uri="{FF2B5EF4-FFF2-40B4-BE49-F238E27FC236}">
-                <a16:creationId xmlns:a16="http://schemas.microsoft.com/office/drawing/2014/main" id="{1DE844F3-CB05-9141-815E-4BDE61AA343C}"/>
-              </a:ext>
-            </a:extLst>
-          </p:cNvPr>
-          <p:cNvPicPr>
-            <a:picLocks noGrp="1" noChangeAspect="1"/>
-          </p:cNvPicPr>
-          <p:nvPr>
-            <p:ph type="pic" sz="quarter" idx="14"/>
-          </p:nvPr>
-        </p:nvPicPr>
-        <p:blipFill rotWithShape="1">
-          <a:blip r:embed="rId2"/>
-          <a:srcRect l="6194" r="6194"/>
-          <a:stretch/>
-        </p:blipFill>
-        <p:spPr>
-          <a:xfrm>
-            <a:off x="5369627" y="1"/>
-            <a:ext cx="1862553" cy="3191425"/>
-          </a:xfrm>
-        </p:spPr>
-      </p:pic>
-      <p:pic>
-        <p:nvPicPr>
-          <p:cNvPr id="26" name="Picture Placeholder 25" descr="The Brain Rock sculpture on T. Anne Cleary Walkway">
-            <a:extLst>
-              <a:ext uri="{FF2B5EF4-FFF2-40B4-BE49-F238E27FC236}">
-                <a16:creationId xmlns:a16="http://schemas.microsoft.com/office/drawing/2014/main" id="{F2FE15C4-FB15-5743-B3D1-00163AE61067}"/>
-              </a:ext>
-            </a:extLst>
-          </p:cNvPr>
-          <p:cNvPicPr>
-            <a:picLocks noGrp="1" noChangeAspect="1"/>
-          </p:cNvPicPr>
-          <p:nvPr>
-            <p:ph type="pic" sz="quarter" idx="15"/>
-          </p:nvPr>
-        </p:nvPicPr>
-        <p:blipFill rotWithShape="1">
-          <a:blip r:embed="rId3"/>
-          <a:srcRect l="6231" r="6231"/>
-          <a:stretch/>
-        </p:blipFill>
-        <p:spPr>
-          <a:xfrm>
-            <a:off x="7285223" y="1"/>
-            <a:ext cx="1862553" cy="3191425"/>
-          </a:xfrm>
-        </p:spPr>
-      </p:pic>
-      <p:pic>
-        <p:nvPicPr>
-          <p:cNvPr id="31" name="Picture Placeholder 30" descr="A group of flags on a bridge in front of a group of buildings">
-            <a:extLst>
-              <a:ext uri="{FF2B5EF4-FFF2-40B4-BE49-F238E27FC236}">
-                <a16:creationId xmlns:a16="http://schemas.microsoft.com/office/drawing/2014/main" id="{BB382611-BC45-6546-BA62-D32A0ABC4545}"/>
-              </a:ext>
-            </a:extLst>
-          </p:cNvPr>
-          <p:cNvPicPr>
-            <a:picLocks noGrp="1" noChangeAspect="1"/>
-          </p:cNvPicPr>
-          <p:nvPr>
-            <p:ph type="pic" sz="quarter" idx="11"/>
-          </p:nvPr>
-        </p:nvPicPr>
-        <p:blipFill rotWithShape="1">
-          <a:blip r:embed="rId4"/>
-          <a:srcRect l="5648" r="5648"/>
-          <a:stretch/>
-        </p:blipFill>
-        <p:spPr>
-          <a:xfrm>
-            <a:off x="5369627" y="3234551"/>
-            <a:ext cx="3774374" cy="3163824"/>
-          </a:xfrm>
-        </p:spPr>
-      </p:pic>
+              <a:t>LSTM Approach</a:t>
+            </a:r>
+          </a:p>
+        </p:txBody>
+      </p:sp>
     </p:spTree>
     <p:extLst>
       <p:ext uri="{BB962C8B-B14F-4D97-AF65-F5344CB8AC3E}">
-        <p14:creationId xmlns:p14="http://schemas.microsoft.com/office/powerpoint/2010/main" val="3838511805"/>
+        <p14:creationId xmlns:p14="http://schemas.microsoft.com/office/powerpoint/2010/main" val="1467696293"/>
       </p:ext>
     </p:extLst>
   </p:cSld>
@@ -21908,7 +21452,7 @@
         <p:spPr>
           <a:xfrm>
             <a:off x="714375" y="365126"/>
-            <a:ext cx="3940879" cy="1331865"/>
+            <a:ext cx="8250721" cy="1331865"/>
           </a:xfrm>
         </p:spPr>
         <p:txBody>
@@ -21919,161 +21463,69 @@
           <a:p>
             <a:r>
               <a:rPr lang="en-US" dirty="0"/>
-              <a:t>LSTM Results</a:t>
-            </a:r>
-          </a:p>
-        </p:txBody>
-      </p:sp>
-      <p:sp>
-        <p:nvSpPr>
-          <p:cNvPr id="6" name="Content Placeholder 5">
-            <a:extLst>
-              <a:ext uri="{FF2B5EF4-FFF2-40B4-BE49-F238E27FC236}">
-                <a16:creationId xmlns:a16="http://schemas.microsoft.com/office/drawing/2014/main" id="{EBF853B9-354A-4F68-BCD2-DAB8430A1118}"/>
-              </a:ext>
-            </a:extLst>
-          </p:cNvPr>
-          <p:cNvSpPr>
-            <a:spLocks noGrp="1"/>
-          </p:cNvSpPr>
-          <p:nvPr>
-            <p:ph idx="1"/>
-          </p:nvPr>
-        </p:nvSpPr>
-        <p:spPr>
-          <a:xfrm>
-            <a:off x="714374" y="1962386"/>
-            <a:ext cx="3949838" cy="3981214"/>
-          </a:xfrm>
-        </p:spPr>
-        <p:txBody>
-          <a:bodyPr/>
-          <a:lstStyle/>
-          <a:p>
-            <a:r>
-              <a:rPr lang="en-US"/>
-              <a:t>Item one</a:t>
-            </a:r>
-          </a:p>
-          <a:p>
-            <a:r>
-              <a:rPr lang="en-US"/>
-              <a:t>Item two</a:t>
-            </a:r>
-          </a:p>
-          <a:p>
-            <a:r>
-              <a:rPr lang="en-US"/>
-              <a:t>Item three</a:t>
-            </a:r>
-          </a:p>
-          <a:p>
-            <a:pPr lvl="1"/>
-            <a:r>
-              <a:rPr lang="en-US"/>
-              <a:t>Sub item one</a:t>
-            </a:r>
-          </a:p>
-          <a:p>
-            <a:pPr lvl="1"/>
-            <a:r>
-              <a:rPr lang="en-US"/>
-              <a:t>Sub item two</a:t>
-            </a:r>
-          </a:p>
-          <a:p>
-            <a:r>
-              <a:rPr lang="en-US"/>
-              <a:t>Item four</a:t>
-            </a:r>
-          </a:p>
-          <a:p>
-            <a:endParaRPr lang="en-US" dirty="0"/>
+              <a:t>LSTM Results – Predicting Temperature</a:t>
+            </a:r>
           </a:p>
         </p:txBody>
       </p:sp>
       <p:pic>
         <p:nvPicPr>
-          <p:cNvPr id="21" name="Picture Placeholder 20" descr="Two students sitting on the steps with Old Capitol in the background">
-            <a:extLst>
-              <a:ext uri="{FF2B5EF4-FFF2-40B4-BE49-F238E27FC236}">
-                <a16:creationId xmlns:a16="http://schemas.microsoft.com/office/drawing/2014/main" id="{1DE844F3-CB05-9141-815E-4BDE61AA343C}"/>
+          <p:cNvPr id="13" name="Picture 12">
+            <a:extLst>
+              <a:ext uri="{FF2B5EF4-FFF2-40B4-BE49-F238E27FC236}">
+                <a16:creationId xmlns:a16="http://schemas.microsoft.com/office/drawing/2014/main" id="{E2EB9DC9-5AC0-4A34-8D4C-98A08A0E016E}"/>
               </a:ext>
             </a:extLst>
           </p:cNvPr>
           <p:cNvPicPr>
-            <a:picLocks noGrp="1" noChangeAspect="1"/>
+            <a:picLocks noChangeAspect="1"/>
           </p:cNvPicPr>
-          <p:nvPr>
-            <p:ph type="pic" sz="quarter" idx="14"/>
-          </p:nvPr>
+          <p:nvPr/>
         </p:nvPicPr>
-        <p:blipFill rotWithShape="1">
+        <p:blipFill>
           <a:blip r:embed="rId2"/>
-          <a:srcRect l="6194" r="6194"/>
-          <a:stretch/>
+          <a:stretch>
+            <a:fillRect/>
+          </a:stretch>
         </p:blipFill>
         <p:spPr>
           <a:xfrm>
-            <a:off x="5369627" y="1"/>
-            <a:ext cx="1862553" cy="3191425"/>
-          </a:xfrm>
+            <a:off x="714375" y="2449693"/>
+            <a:ext cx="3581400" cy="2428875"/>
+          </a:xfrm>
+          <a:prstGeom prst="rect">
+            <a:avLst/>
+          </a:prstGeom>
         </p:spPr>
       </p:pic>
       <p:pic>
         <p:nvPicPr>
-          <p:cNvPr id="26" name="Picture Placeholder 25" descr="The Brain Rock sculpture on T. Anne Cleary Walkway">
-            <a:extLst>
-              <a:ext uri="{FF2B5EF4-FFF2-40B4-BE49-F238E27FC236}">
-                <a16:creationId xmlns:a16="http://schemas.microsoft.com/office/drawing/2014/main" id="{F2FE15C4-FB15-5743-B3D1-00163AE61067}"/>
+          <p:cNvPr id="15" name="Picture 14">
+            <a:extLst>
+              <a:ext uri="{FF2B5EF4-FFF2-40B4-BE49-F238E27FC236}">
+                <a16:creationId xmlns:a16="http://schemas.microsoft.com/office/drawing/2014/main" id="{5BC3779E-34B3-4BBB-BDE8-A34F35D10656}"/>
               </a:ext>
             </a:extLst>
           </p:cNvPr>
           <p:cNvPicPr>
-            <a:picLocks noGrp="1" noChangeAspect="1"/>
+            <a:picLocks noChangeAspect="1"/>
           </p:cNvPicPr>
-          <p:nvPr>
-            <p:ph type="pic" sz="quarter" idx="15"/>
-          </p:nvPr>
+          <p:nvPr/>
         </p:nvPicPr>
-        <p:blipFill rotWithShape="1">
+        <p:blipFill>
           <a:blip r:embed="rId3"/>
-          <a:srcRect l="6231" r="6231"/>
-          <a:stretch/>
+          <a:stretch>
+            <a:fillRect/>
+          </a:stretch>
         </p:blipFill>
         <p:spPr>
           <a:xfrm>
-            <a:off x="7285223" y="1"/>
-            <a:ext cx="1862553" cy="3191425"/>
-          </a:xfrm>
-        </p:spPr>
-      </p:pic>
-      <p:pic>
-        <p:nvPicPr>
-          <p:cNvPr id="31" name="Picture Placeholder 30" descr="A group of flags on a bridge in front of a group of buildings">
-            <a:extLst>
-              <a:ext uri="{FF2B5EF4-FFF2-40B4-BE49-F238E27FC236}">
-                <a16:creationId xmlns:a16="http://schemas.microsoft.com/office/drawing/2014/main" id="{BB382611-BC45-6546-BA62-D32A0ABC4545}"/>
-              </a:ext>
-            </a:extLst>
-          </p:cNvPr>
-          <p:cNvPicPr>
-            <a:picLocks noGrp="1" noChangeAspect="1"/>
-          </p:cNvPicPr>
-          <p:nvPr>
-            <p:ph type="pic" sz="quarter" idx="11"/>
-          </p:nvPr>
-        </p:nvPicPr>
-        <p:blipFill rotWithShape="1">
-          <a:blip r:embed="rId4"/>
-          <a:srcRect l="5648" r="5648"/>
-          <a:stretch/>
-        </p:blipFill>
-        <p:spPr>
-          <a:xfrm>
-            <a:off x="5369627" y="3234551"/>
-            <a:ext cx="3774374" cy="3163824"/>
-          </a:xfrm>
+            <a:off x="4991100" y="2638287"/>
+            <a:ext cx="3438525" cy="2286000"/>
+          </a:xfrm>
+          <a:prstGeom prst="rect">
+            <a:avLst/>
+          </a:prstGeom>
         </p:spPr>
       </p:pic>
     </p:spTree>
@@ -22108,10 +21560,10 @@
       </p:grpSpPr>
       <p:sp>
         <p:nvSpPr>
-          <p:cNvPr id="9" name="Title 8">
-            <a:extLst>
-              <a:ext uri="{FF2B5EF4-FFF2-40B4-BE49-F238E27FC236}">
-                <a16:creationId xmlns:a16="http://schemas.microsoft.com/office/drawing/2014/main" id="{51FD1423-EF69-4C43-9403-3B2C2334DA10}"/>
+          <p:cNvPr id="5" name="Title 4">
+            <a:extLst>
+              <a:ext uri="{FF2B5EF4-FFF2-40B4-BE49-F238E27FC236}">
+                <a16:creationId xmlns:a16="http://schemas.microsoft.com/office/drawing/2014/main" id="{8E864A94-2733-4500-9289-9518C7EA1563}"/>
               </a:ext>
             </a:extLst>
           </p:cNvPr>
@@ -22124,322 +21576,87 @@
         </p:nvSpPr>
         <p:spPr>
           <a:xfrm>
-            <a:off x="714375" y="526778"/>
-            <a:ext cx="7715251" cy="869089"/>
-          </a:xfrm>
-        </p:spPr>
-        <p:txBody>
-          <a:bodyPr/>
+            <a:off x="714375" y="365126"/>
+            <a:ext cx="8181147" cy="1331865"/>
+          </a:xfrm>
+        </p:spPr>
+        <p:txBody>
+          <a:bodyPr>
+            <a:normAutofit/>
+          </a:bodyPr>
           <a:lstStyle/>
           <a:p>
             <a:r>
               <a:rPr lang="en-US" dirty="0"/>
-              <a:t>Three columns with photos</a:t>
+              <a:t>LSTM Results – Predicting Sound Levels</a:t>
             </a:r>
           </a:p>
         </p:txBody>
       </p:sp>
       <p:pic>
         <p:nvPicPr>
-          <p:cNvPr id="32" name="Picture Placeholder 31" descr="A group of people playing volleyball in downtown Iowa City">
-            <a:extLst>
-              <a:ext uri="{FF2B5EF4-FFF2-40B4-BE49-F238E27FC236}">
-                <a16:creationId xmlns:a16="http://schemas.microsoft.com/office/drawing/2014/main" id="{84134591-805C-BC43-9590-EFC9EA20A50F}"/>
+          <p:cNvPr id="13" name="Picture 12">
+            <a:extLst>
+              <a:ext uri="{FF2B5EF4-FFF2-40B4-BE49-F238E27FC236}">
+                <a16:creationId xmlns:a16="http://schemas.microsoft.com/office/drawing/2014/main" id="{8F7D1B60-1E95-42BA-B91C-FF872A6A23DF}"/>
               </a:ext>
             </a:extLst>
           </p:cNvPr>
           <p:cNvPicPr>
-            <a:picLocks noGrp="1" noChangeAspect="1"/>
+            <a:picLocks noChangeAspect="1"/>
           </p:cNvPicPr>
-          <p:nvPr>
-            <p:ph type="pic" sz="quarter" idx="15"/>
-          </p:nvPr>
+          <p:nvPr/>
         </p:nvPicPr>
-        <p:blipFill rotWithShape="1">
+        <p:blipFill>
           <a:blip r:embed="rId2"/>
-          <a:srcRect l="1174" r="1174"/>
-          <a:stretch/>
+          <a:stretch>
+            <a:fillRect/>
+          </a:stretch>
         </p:blipFill>
         <p:spPr>
           <a:xfrm>
-            <a:off x="711994" y="1684461"/>
-            <a:ext cx="2377679" cy="1621608"/>
-          </a:xfrm>
+            <a:off x="714375" y="2632574"/>
+            <a:ext cx="3495675" cy="2428875"/>
+          </a:xfrm>
+          <a:prstGeom prst="rect">
+            <a:avLst/>
+          </a:prstGeom>
         </p:spPr>
       </p:pic>
-      <p:sp>
-        <p:nvSpPr>
-          <p:cNvPr id="2" name="Content Placeholder 1">
-            <a:extLst>
-              <a:ext uri="{FF2B5EF4-FFF2-40B4-BE49-F238E27FC236}">
-                <a16:creationId xmlns:a16="http://schemas.microsoft.com/office/drawing/2014/main" id="{71B75814-CA78-4990-B92F-D58A9492E46A}"/>
-              </a:ext>
-            </a:extLst>
-          </p:cNvPr>
-          <p:cNvSpPr>
-            <a:spLocks noGrp="1"/>
-          </p:cNvSpPr>
-          <p:nvPr>
-            <p:ph idx="1"/>
-          </p:nvPr>
-        </p:nvSpPr>
-        <p:spPr>
-          <a:xfrm>
-            <a:off x="714375" y="3548916"/>
-            <a:ext cx="2375055" cy="754602"/>
-          </a:xfrm>
-        </p:spPr>
-        <p:txBody>
-          <a:bodyPr/>
-          <a:lstStyle/>
-          <a:p>
-            <a:r>
-              <a:rPr lang="en-US" dirty="0"/>
-              <a:t>Column title one goes in this space</a:t>
-            </a:r>
-          </a:p>
-        </p:txBody>
-      </p:sp>
-      <p:sp>
-        <p:nvSpPr>
-          <p:cNvPr id="3" name="Content Placeholder 2">
-            <a:extLst>
-              <a:ext uri="{FF2B5EF4-FFF2-40B4-BE49-F238E27FC236}">
-                <a16:creationId xmlns:a16="http://schemas.microsoft.com/office/drawing/2014/main" id="{7623F6F3-D3DF-4279-86A3-7F8CB799918C}"/>
-              </a:ext>
-            </a:extLst>
-          </p:cNvPr>
-          <p:cNvSpPr>
-            <a:spLocks noGrp="1"/>
-          </p:cNvSpPr>
-          <p:nvPr>
-            <p:ph idx="10"/>
-          </p:nvPr>
-        </p:nvSpPr>
-        <p:spPr>
-          <a:xfrm>
-            <a:off x="714376" y="4264538"/>
-            <a:ext cx="2375055" cy="1408471"/>
-          </a:xfrm>
-        </p:spPr>
-        <p:txBody>
-          <a:bodyPr>
-            <a:normAutofit lnSpcReduction="10000"/>
-          </a:bodyPr>
-          <a:lstStyle/>
-          <a:p>
-            <a:r>
-              <a:rPr lang="en-US" dirty="0"/>
-              <a:t>Supporting text goes down here Supporting text goes down here Supporting text goes down here Supporting text goes down here.</a:t>
-            </a:r>
-          </a:p>
-        </p:txBody>
-      </p:sp>
       <p:pic>
         <p:nvPicPr>
-          <p:cNvPr id="28" name="Picture Placeholder 27" descr="Graduate posing with a statue of Herky on the Pentacrest in Iowa City">
-            <a:extLst>
-              <a:ext uri="{FF2B5EF4-FFF2-40B4-BE49-F238E27FC236}">
-                <a16:creationId xmlns:a16="http://schemas.microsoft.com/office/drawing/2014/main" id="{7BC06931-D8EB-4B43-8536-80343F9BE256}"/>
+          <p:cNvPr id="15" name="Picture 14">
+            <a:extLst>
+              <a:ext uri="{FF2B5EF4-FFF2-40B4-BE49-F238E27FC236}">
+                <a16:creationId xmlns:a16="http://schemas.microsoft.com/office/drawing/2014/main" id="{1B21EFA2-7D72-484C-8C25-BDA318DAAFE5}"/>
               </a:ext>
             </a:extLst>
           </p:cNvPr>
           <p:cNvPicPr>
-            <a:picLocks noGrp="1" noChangeAspect="1"/>
+            <a:picLocks noChangeAspect="1"/>
           </p:cNvPicPr>
-          <p:nvPr>
-            <p:ph type="pic" sz="quarter" idx="16"/>
-          </p:nvPr>
+          <p:nvPr/>
         </p:nvPicPr>
-        <p:blipFill rotWithShape="1">
+        <p:blipFill>
           <a:blip r:embed="rId3"/>
-          <a:srcRect l="3901" r="3901"/>
-          <a:stretch/>
+          <a:stretch>
+            <a:fillRect/>
+          </a:stretch>
         </p:blipFill>
         <p:spPr>
           <a:xfrm>
-            <a:off x="3451836" y="1677611"/>
-            <a:ext cx="2240483" cy="1621608"/>
-          </a:xfrm>
+            <a:off x="4933952" y="2756399"/>
+            <a:ext cx="3524250" cy="2305050"/>
+          </a:xfrm>
+          <a:prstGeom prst="rect">
+            <a:avLst/>
+          </a:prstGeom>
         </p:spPr>
       </p:pic>
-      <p:sp>
-        <p:nvSpPr>
-          <p:cNvPr id="4" name="Content Placeholder 3">
-            <a:extLst>
-              <a:ext uri="{FF2B5EF4-FFF2-40B4-BE49-F238E27FC236}">
-                <a16:creationId xmlns:a16="http://schemas.microsoft.com/office/drawing/2014/main" id="{EB4D859F-8AAA-4CD2-B46F-EC628FBC80FB}"/>
-              </a:ext>
-            </a:extLst>
-          </p:cNvPr>
-          <p:cNvSpPr>
-            <a:spLocks noGrp="1"/>
-          </p:cNvSpPr>
-          <p:nvPr>
-            <p:ph idx="11"/>
-          </p:nvPr>
-        </p:nvSpPr>
-        <p:spPr>
-          <a:xfrm>
-            <a:off x="3462289" y="3537679"/>
-            <a:ext cx="2230029" cy="754602"/>
-          </a:xfrm>
-        </p:spPr>
-        <p:txBody>
-          <a:bodyPr/>
-          <a:lstStyle/>
-          <a:p>
-            <a:r>
-              <a:rPr lang="en-US" dirty="0"/>
-              <a:t>Column title two goes in this space</a:t>
-            </a:r>
-          </a:p>
-          <a:p>
-            <a:endParaRPr lang="en-US" dirty="0"/>
-          </a:p>
-        </p:txBody>
-      </p:sp>
-      <p:sp>
-        <p:nvSpPr>
-          <p:cNvPr id="5" name="Content Placeholder 4">
-            <a:extLst>
-              <a:ext uri="{FF2B5EF4-FFF2-40B4-BE49-F238E27FC236}">
-                <a16:creationId xmlns:a16="http://schemas.microsoft.com/office/drawing/2014/main" id="{CB3307FC-8F50-4F47-A294-FED5621237BA}"/>
-              </a:ext>
-            </a:extLst>
-          </p:cNvPr>
-          <p:cNvSpPr>
-            <a:spLocks noGrp="1"/>
-          </p:cNvSpPr>
-          <p:nvPr>
-            <p:ph idx="12"/>
-          </p:nvPr>
-        </p:nvSpPr>
-        <p:spPr>
-          <a:xfrm>
-            <a:off x="3462290" y="4253301"/>
-            <a:ext cx="2230029" cy="1408471"/>
-          </a:xfrm>
-        </p:spPr>
-        <p:txBody>
-          <a:bodyPr>
-            <a:normAutofit lnSpcReduction="10000"/>
-          </a:bodyPr>
-          <a:lstStyle/>
-          <a:p>
-            <a:r>
-              <a:rPr lang="en-US" dirty="0"/>
-              <a:t>Supporting text goes down here Supporting text goes down here Supporting text goes down here Supporting text goes down here. </a:t>
-            </a:r>
-          </a:p>
-          <a:p>
-            <a:endParaRPr lang="en-US" dirty="0"/>
-          </a:p>
-        </p:txBody>
-      </p:sp>
-      <p:pic>
-        <p:nvPicPr>
-          <p:cNvPr id="24" name="Picture Placeholder 23" descr="Students sitting on the banks of the Iowa River">
-            <a:extLst>
-              <a:ext uri="{FF2B5EF4-FFF2-40B4-BE49-F238E27FC236}">
-                <a16:creationId xmlns:a16="http://schemas.microsoft.com/office/drawing/2014/main" id="{D1F83ECE-B047-8A47-B756-984AF3C75522}"/>
-              </a:ext>
-            </a:extLst>
-          </p:cNvPr>
-          <p:cNvPicPr>
-            <a:picLocks noGrp="1" noChangeAspect="1"/>
-          </p:cNvPicPr>
-          <p:nvPr>
-            <p:ph type="pic" sz="quarter" idx="17"/>
-          </p:nvPr>
-        </p:nvPicPr>
-        <p:blipFill rotWithShape="1">
-          <a:blip r:embed="rId4"/>
-          <a:srcRect l="1207" r="1207"/>
-          <a:stretch/>
-        </p:blipFill>
-        <p:spPr>
-          <a:xfrm>
-            <a:off x="6054481" y="1684461"/>
-            <a:ext cx="2375144" cy="1621608"/>
-          </a:xfrm>
-        </p:spPr>
-      </p:pic>
-      <p:sp>
-        <p:nvSpPr>
-          <p:cNvPr id="6" name="Content Placeholder 5">
-            <a:extLst>
-              <a:ext uri="{FF2B5EF4-FFF2-40B4-BE49-F238E27FC236}">
-                <a16:creationId xmlns:a16="http://schemas.microsoft.com/office/drawing/2014/main" id="{BA39EB02-FDF3-4647-81D9-E19EDEFB2BA5}"/>
-              </a:ext>
-            </a:extLst>
-          </p:cNvPr>
-          <p:cNvSpPr>
-            <a:spLocks noGrp="1"/>
-          </p:cNvSpPr>
-          <p:nvPr>
-            <p:ph idx="13"/>
-          </p:nvPr>
-        </p:nvSpPr>
-        <p:spPr>
-          <a:xfrm>
-            <a:off x="6047636" y="3537679"/>
-            <a:ext cx="2375055" cy="754602"/>
-          </a:xfrm>
-        </p:spPr>
-        <p:txBody>
-          <a:bodyPr/>
-          <a:lstStyle/>
-          <a:p>
-            <a:r>
-              <a:rPr lang="en-US" dirty="0"/>
-              <a:t>Column title three goes in this space</a:t>
-            </a:r>
-          </a:p>
-          <a:p>
-            <a:endParaRPr lang="en-US" dirty="0"/>
-          </a:p>
-        </p:txBody>
-      </p:sp>
-      <p:sp>
-        <p:nvSpPr>
-          <p:cNvPr id="7" name="Content Placeholder 6">
-            <a:extLst>
-              <a:ext uri="{FF2B5EF4-FFF2-40B4-BE49-F238E27FC236}">
-                <a16:creationId xmlns:a16="http://schemas.microsoft.com/office/drawing/2014/main" id="{75330018-79E4-41FB-A265-8C0D9891AAA3}"/>
-              </a:ext>
-            </a:extLst>
-          </p:cNvPr>
-          <p:cNvSpPr>
-            <a:spLocks noGrp="1"/>
-          </p:cNvSpPr>
-          <p:nvPr>
-            <p:ph idx="14"/>
-          </p:nvPr>
-        </p:nvSpPr>
-        <p:spPr>
-          <a:xfrm>
-            <a:off x="6047636" y="4253301"/>
-            <a:ext cx="2375055" cy="1408471"/>
-          </a:xfrm>
-        </p:spPr>
-        <p:txBody>
-          <a:bodyPr>
-            <a:normAutofit lnSpcReduction="10000"/>
-          </a:bodyPr>
-          <a:lstStyle/>
-          <a:p>
-            <a:r>
-              <a:rPr lang="en-US" dirty="0"/>
-              <a:t>Supporting text goes down here Supporting text goes down here Supporting text goes down here Supporting text goes down here. </a:t>
-            </a:r>
-          </a:p>
-        </p:txBody>
-      </p:sp>
     </p:spTree>
     <p:extLst>
       <p:ext uri="{BB962C8B-B14F-4D97-AF65-F5344CB8AC3E}">
-        <p14:creationId xmlns:p14="http://schemas.microsoft.com/office/powerpoint/2010/main" val="3803666224"/>
+        <p14:creationId xmlns:p14="http://schemas.microsoft.com/office/powerpoint/2010/main" val="3838511805"/>
       </p:ext>
     </p:extLst>
   </p:cSld>
@@ -22468,10 +21685,10 @@
       </p:grpSpPr>
       <p:sp>
         <p:nvSpPr>
-          <p:cNvPr id="3" name="Title 2">
-            <a:extLst>
-              <a:ext uri="{FF2B5EF4-FFF2-40B4-BE49-F238E27FC236}">
-                <a16:creationId xmlns:a16="http://schemas.microsoft.com/office/drawing/2014/main" id="{0372AD14-BED4-4A3E-8474-5AB4CAE61C4F}"/>
+          <p:cNvPr id="5" name="Title 4">
+            <a:extLst>
+              <a:ext uri="{FF2B5EF4-FFF2-40B4-BE49-F238E27FC236}">
+                <a16:creationId xmlns:a16="http://schemas.microsoft.com/office/drawing/2014/main" id="{8E864A94-2733-4500-9289-9518C7EA1563}"/>
               </a:ext>
             </a:extLst>
           </p:cNvPr>
@@ -22479,98 +21696,92 @@
             <a:spLocks noGrp="1"/>
           </p:cNvSpPr>
           <p:nvPr>
-            <p:ph type="ctrTitle"/>
+            <p:ph type="title"/>
           </p:nvPr>
         </p:nvSpPr>
         <p:spPr>
           <a:xfrm>
-            <a:off x="711994" y="3214770"/>
-            <a:ext cx="5372488" cy="1160369"/>
-          </a:xfrm>
-        </p:spPr>
-        <p:txBody>
-          <a:bodyPr/>
+            <a:off x="714375" y="365126"/>
+            <a:ext cx="8181147" cy="1331865"/>
+          </a:xfrm>
+        </p:spPr>
+        <p:txBody>
+          <a:bodyPr>
+            <a:normAutofit/>
+          </a:bodyPr>
           <a:lstStyle/>
           <a:p>
             <a:r>
-              <a:rPr lang="en-US"/>
-              <a:t>Questions?</a:t>
-            </a:r>
-            <a:endParaRPr lang="en-US" dirty="0"/>
-          </a:p>
-        </p:txBody>
-      </p:sp>
-      <p:sp>
-        <p:nvSpPr>
-          <p:cNvPr id="5" name="Text Placeholder 4">
-            <a:extLst>
-              <a:ext uri="{FF2B5EF4-FFF2-40B4-BE49-F238E27FC236}">
-                <a16:creationId xmlns:a16="http://schemas.microsoft.com/office/drawing/2014/main" id="{D6392C30-4B11-4481-945C-ED83B657CADA}"/>
-              </a:ext>
-            </a:extLst>
-          </p:cNvPr>
-          <p:cNvSpPr>
-            <a:spLocks noGrp="1"/>
-          </p:cNvSpPr>
-          <p:nvPr>
-            <p:ph type="body" sz="quarter" idx="12"/>
-          </p:nvPr>
-        </p:nvSpPr>
-        <p:spPr>
-          <a:xfrm>
-            <a:off x="5714999" y="2800421"/>
-            <a:ext cx="3735663" cy="1498329"/>
-          </a:xfrm>
-        </p:spPr>
-        <p:txBody>
-          <a:bodyPr/>
-          <a:lstStyle/>
-          <a:p>
-            <a:r>
-              <a:rPr lang="en-US" sz="1400" dirty="0"/>
-              <a:t>Email: Evan-Bradley@uiowa.edu</a:t>
-            </a:r>
-          </a:p>
-        </p:txBody>
-      </p:sp>
-      <p:sp>
-        <p:nvSpPr>
-          <p:cNvPr id="2" name="Text Placeholder 1">
-            <a:extLst>
-              <a:ext uri="{FF2B5EF4-FFF2-40B4-BE49-F238E27FC236}">
-                <a16:creationId xmlns:a16="http://schemas.microsoft.com/office/drawing/2014/main" id="{667688D6-D1F7-479C-B181-0D4C46EDC327}"/>
-              </a:ext>
-            </a:extLst>
-          </p:cNvPr>
-          <p:cNvSpPr>
-            <a:spLocks noGrp="1"/>
-          </p:cNvSpPr>
-          <p:nvPr>
-            <p:ph type="body" sz="quarter" idx="10"/>
-          </p:nvPr>
-        </p:nvSpPr>
-        <p:spPr>
-          <a:xfrm>
-            <a:off x="989013" y="4789488"/>
-            <a:ext cx="1111930" cy="300037"/>
-          </a:xfrm>
-        </p:spPr>
-        <p:txBody>
-          <a:bodyPr/>
-          <a:lstStyle/>
-          <a:p>
-            <a:r>
-              <a:rPr lang="en-US" dirty="0" err="1"/>
-              <a:t>uiowa.edu</a:t>
-            </a:r>
-            <a:endParaRPr lang="en-US" dirty="0"/>
-          </a:p>
-        </p:txBody>
-      </p:sp>
+              <a:rPr lang="en-US" dirty="0"/>
+              <a:t>LSTM Results – Predicting PM10 Levels</a:t>
+            </a:r>
+          </a:p>
+        </p:txBody>
+      </p:sp>
+      <p:pic>
+        <p:nvPicPr>
+          <p:cNvPr id="3" name="Picture 2">
+            <a:extLst>
+              <a:ext uri="{FF2B5EF4-FFF2-40B4-BE49-F238E27FC236}">
+                <a16:creationId xmlns:a16="http://schemas.microsoft.com/office/drawing/2014/main" id="{29B89492-82BF-450C-9EEA-F473A1A3255B}"/>
+              </a:ext>
+            </a:extLst>
+          </p:cNvPr>
+          <p:cNvPicPr>
+            <a:picLocks noChangeAspect="1"/>
+          </p:cNvPicPr>
+          <p:nvPr/>
+        </p:nvPicPr>
+        <p:blipFill>
+          <a:blip r:embed="rId2"/>
+          <a:stretch>
+            <a:fillRect/>
+          </a:stretch>
+        </p:blipFill>
+        <p:spPr>
+          <a:xfrm>
+            <a:off x="444272" y="2552972"/>
+            <a:ext cx="3552825" cy="2457450"/>
+          </a:xfrm>
+          <a:prstGeom prst="rect">
+            <a:avLst/>
+          </a:prstGeom>
+        </p:spPr>
+      </p:pic>
+      <p:pic>
+        <p:nvPicPr>
+          <p:cNvPr id="6" name="Picture 5">
+            <a:extLst>
+              <a:ext uri="{FF2B5EF4-FFF2-40B4-BE49-F238E27FC236}">
+                <a16:creationId xmlns:a16="http://schemas.microsoft.com/office/drawing/2014/main" id="{394DDF0F-7153-4057-820E-C94C7AD1646F}"/>
+              </a:ext>
+            </a:extLst>
+          </p:cNvPr>
+          <p:cNvPicPr>
+            <a:picLocks noChangeAspect="1"/>
+          </p:cNvPicPr>
+          <p:nvPr/>
+        </p:nvPicPr>
+        <p:blipFill>
+          <a:blip r:embed="rId3"/>
+          <a:stretch>
+            <a:fillRect/>
+          </a:stretch>
+        </p:blipFill>
+        <p:spPr>
+          <a:xfrm>
+            <a:off x="5146905" y="2695847"/>
+            <a:ext cx="3457575" cy="2314575"/>
+          </a:xfrm>
+          <a:prstGeom prst="rect">
+            <a:avLst/>
+          </a:prstGeom>
+        </p:spPr>
+      </p:pic>
     </p:spTree>
     <p:extLst>
       <p:ext uri="{BB962C8B-B14F-4D97-AF65-F5344CB8AC3E}">
-        <p14:creationId xmlns:p14="http://schemas.microsoft.com/office/powerpoint/2010/main" val="3100679256"/>
+        <p14:creationId xmlns:p14="http://schemas.microsoft.com/office/powerpoint/2010/main" val="2376669303"/>
       </p:ext>
     </p:extLst>
   </p:cSld>
@@ -22581,6 +21792,109 @@
 </file>
 
 <file path=ppt/slides/slide17.xml><?xml version="1.0" encoding="utf-8"?>
+<p:sld xmlns:a="http://schemas.openxmlformats.org/drawingml/2006/main" xmlns:r="http://schemas.openxmlformats.org/officeDocument/2006/relationships" xmlns:p="http://schemas.openxmlformats.org/presentationml/2006/main">
+  <p:cSld>
+    <p:spTree>
+      <p:nvGrpSpPr>
+        <p:cNvPr id="1" name=""/>
+        <p:cNvGrpSpPr/>
+        <p:nvPr/>
+      </p:nvGrpSpPr>
+      <p:grpSpPr>
+        <a:xfrm>
+          <a:off x="0" y="0"/>
+          <a:ext cx="0" cy="0"/>
+          <a:chOff x="0" y="0"/>
+          <a:chExt cx="0" cy="0"/>
+        </a:xfrm>
+      </p:grpSpPr>
+      <p:sp>
+        <p:nvSpPr>
+          <p:cNvPr id="2" name="Title 1">
+            <a:extLst>
+              <a:ext uri="{FF2B5EF4-FFF2-40B4-BE49-F238E27FC236}">
+                <a16:creationId xmlns:a16="http://schemas.microsoft.com/office/drawing/2014/main" id="{F5729F13-9BCE-462D-BAC4-3E8A74D57186}"/>
+              </a:ext>
+            </a:extLst>
+          </p:cNvPr>
+          <p:cNvSpPr>
+            <a:spLocks noGrp="1"/>
+          </p:cNvSpPr>
+          <p:nvPr>
+            <p:ph type="title"/>
+          </p:nvPr>
+        </p:nvSpPr>
+        <p:spPr/>
+        <p:txBody>
+          <a:bodyPr/>
+          <a:lstStyle/>
+          <a:p>
+            <a:r>
+              <a:rPr lang="en-US" dirty="0"/>
+              <a:t>Conclusion</a:t>
+            </a:r>
+          </a:p>
+        </p:txBody>
+      </p:sp>
+      <p:sp>
+        <p:nvSpPr>
+          <p:cNvPr id="3" name="Content Placeholder 2">
+            <a:extLst>
+              <a:ext uri="{FF2B5EF4-FFF2-40B4-BE49-F238E27FC236}">
+                <a16:creationId xmlns:a16="http://schemas.microsoft.com/office/drawing/2014/main" id="{31EF0D8F-309C-4E9E-A39D-05E3EC6B4F72}"/>
+              </a:ext>
+            </a:extLst>
+          </p:cNvPr>
+          <p:cNvSpPr>
+            <a:spLocks noGrp="1"/>
+          </p:cNvSpPr>
+          <p:nvPr>
+            <p:ph idx="1"/>
+          </p:nvPr>
+        </p:nvSpPr>
+        <p:spPr>
+          <a:xfrm>
+            <a:off x="714373" y="1962386"/>
+            <a:ext cx="7554984" cy="3981214"/>
+          </a:xfrm>
+        </p:spPr>
+        <p:txBody>
+          <a:bodyPr/>
+          <a:lstStyle/>
+          <a:p>
+            <a:r>
+              <a:rPr lang="en-US" dirty="0"/>
+              <a:t>Some features are easier to predict than others </a:t>
+            </a:r>
+          </a:p>
+          <a:p>
+            <a:r>
+              <a:rPr lang="en-US" dirty="0"/>
+              <a:t>More data over a longer time period is necessary</a:t>
+            </a:r>
+          </a:p>
+          <a:p>
+            <a:r>
+              <a:rPr lang="en-US" dirty="0"/>
+              <a:t>Better sound data would help in training</a:t>
+            </a:r>
+          </a:p>
+        </p:txBody>
+      </p:sp>
+    </p:spTree>
+    <p:extLst>
+      <p:ext uri="{BB962C8B-B14F-4D97-AF65-F5344CB8AC3E}">
+        <p14:creationId xmlns:p14="http://schemas.microsoft.com/office/powerpoint/2010/main" val="3405098768"/>
+      </p:ext>
+    </p:extLst>
+  </p:cSld>
+  <p:clrMapOvr>
+    <a:masterClrMapping/>
+  </p:clrMapOvr>
+</p:sld>
+</file>
+
+<file path=ppt/slides/slide18.xml><?xml version="1.0" encoding="utf-8"?>
 <p:sld xmlns:a="http://schemas.openxmlformats.org/drawingml/2006/main" xmlns:r="http://schemas.openxmlformats.org/officeDocument/2006/relationships" xmlns:p="http://schemas.openxmlformats.org/presentationml/2006/main">
   <p:cSld>
     <p:spTree>
@@ -22952,10 +22266,10 @@
       </p:sp>
       <p:pic>
         <p:nvPicPr>
-          <p:cNvPr id="5" name="Picture 4" descr="Diagram&#10;&#10;Description automatically generated">
-            <a:extLst>
-              <a:ext uri="{FF2B5EF4-FFF2-40B4-BE49-F238E27FC236}">
-                <a16:creationId xmlns:a16="http://schemas.microsoft.com/office/drawing/2014/main" id="{627B75D3-6105-47B7-8401-31F96742C772}"/>
+          <p:cNvPr id="6" name="Picture 5" descr="Diagram&#10;&#10;Description automatically generated">
+            <a:extLst>
+              <a:ext uri="{FF2B5EF4-FFF2-40B4-BE49-F238E27FC236}">
+                <a16:creationId xmlns:a16="http://schemas.microsoft.com/office/drawing/2014/main" id="{9AE8284A-59C2-4B98-BE0B-9DCC6A82B9A0}"/>
               </a:ext>
             </a:extLst>
           </p:cNvPr>
@@ -22972,8 +22286,8 @@
         </p:blipFill>
         <p:spPr>
           <a:xfrm>
-            <a:off x="4349951" y="2474844"/>
-            <a:ext cx="4220968" cy="2882349"/>
+            <a:off x="4846775" y="2753760"/>
+            <a:ext cx="3724275" cy="2543175"/>
           </a:xfrm>
           <a:prstGeom prst="rect">
             <a:avLst/>
@@ -23015,7 +22329,7 @@
           <p:cNvPr id="2" name="Title 1">
             <a:extLst>
               <a:ext uri="{FF2B5EF4-FFF2-40B4-BE49-F238E27FC236}">
-                <a16:creationId xmlns:a16="http://schemas.microsoft.com/office/drawing/2014/main" id="{95370379-2B8A-42C0-8174-A22B7008B144}"/>
+                <a16:creationId xmlns:a16="http://schemas.microsoft.com/office/drawing/2014/main" id="{FB42BCA5-B095-4805-84EB-8659BB6E84CE}"/>
               </a:ext>
             </a:extLst>
           </p:cNvPr>
@@ -23026,19 +22340,14 @@
             <p:ph type="title"/>
           </p:nvPr>
         </p:nvSpPr>
-        <p:spPr>
-          <a:xfrm>
-            <a:off x="714375" y="389510"/>
-            <a:ext cx="7715250" cy="1331865"/>
-          </a:xfrm>
-        </p:spPr>
+        <p:spPr/>
         <p:txBody>
           <a:bodyPr/>
           <a:lstStyle/>
           <a:p>
             <a:r>
               <a:rPr lang="en-US" dirty="0"/>
-              <a:t>Proposal</a:t>
+              <a:t>Existing Work</a:t>
             </a:r>
           </a:p>
         </p:txBody>
@@ -23048,7 +22357,7 @@
           <p:cNvPr id="3" name="Content Placeholder 2">
             <a:extLst>
               <a:ext uri="{FF2B5EF4-FFF2-40B4-BE49-F238E27FC236}">
-                <a16:creationId xmlns:a16="http://schemas.microsoft.com/office/drawing/2014/main" id="{AEDCB975-6DEE-435D-BD89-3610736237D1}"/>
+                <a16:creationId xmlns:a16="http://schemas.microsoft.com/office/drawing/2014/main" id="{C4190210-475F-466F-A224-0E97E4F40F0B}"/>
               </a:ext>
             </a:extLst>
           </p:cNvPr>
@@ -23061,8 +22370,8 @@
         </p:nvSpPr>
         <p:spPr>
           <a:xfrm>
-            <a:off x="714375" y="2050741"/>
-            <a:ext cx="7715250" cy="3892859"/>
+            <a:off x="714373" y="1962386"/>
+            <a:ext cx="5656609" cy="3981214"/>
           </a:xfrm>
         </p:spPr>
         <p:txBody>
@@ -23072,48 +22381,64 @@
           <a:lstStyle/>
           <a:p>
             <a:r>
-              <a:rPr lang="en-US" sz="1800" dirty="0"/>
-              <a:t>Which feature measurements are necessary?</a:t>
-            </a:r>
-          </a:p>
-          <a:p>
-            <a:r>
-              <a:rPr lang="en-US" sz="1800" dirty="0"/>
-              <a:t>There might be some hidden relationships in the data that is collected, when machines are running many hazard will likely rise synchronously.</a:t>
-            </a:r>
-          </a:p>
-          <a:p>
-            <a:r>
-              <a:rPr lang="en-US" sz="1800" dirty="0"/>
-              <a:t>Could certain sensors be removed, and measurements accurately replaced by output from a deep learning model?</a:t>
-            </a:r>
-          </a:p>
-          <a:p>
-            <a:r>
-              <a:rPr lang="en-US" sz="1800" dirty="0"/>
-              <a:t>Main goals</a:t>
-            </a:r>
-          </a:p>
-          <a:p>
-            <a:pPr lvl="1"/>
-            <a:r>
-              <a:rPr lang="en-US" sz="1800" dirty="0"/>
-              <a:t>Using data from past deployments of the air sensor network train a model to predict sound levels from an input of time, VOC, CO, PM, Temp, and Humidity </a:t>
-            </a:r>
-          </a:p>
-          <a:p>
-            <a:pPr lvl="1"/>
-            <a:r>
-              <a:rPr lang="en-US" sz="1800" dirty="0"/>
-              <a:t>Train models using other features as labels to see if other hazards could be predicted using less sensor data as input</a:t>
-            </a:r>
-          </a:p>
-        </p:txBody>
-      </p:sp>
+              <a:rPr lang="en-US" sz="2000" dirty="0">
+                <a:hlinkClick r:id="rId2"/>
+              </a:rPr>
+              <a:t>“Low-Cost, Distributed Environmental Monitors for Factory Worker Health</a:t>
+            </a:r>
+            <a:r>
+              <a:rPr lang="en-US" sz="2000" dirty="0"/>
+              <a:t>” - 2018</a:t>
+            </a:r>
+          </a:p>
+          <a:p>
+            <a:r>
+              <a:rPr lang="en-US" sz="2000" dirty="0">
+                <a:hlinkClick r:id="rId3"/>
+              </a:rPr>
+              <a:t>“Indoor Air Quality Analysis Using Deep Learning with Sensor Data”</a:t>
+            </a:r>
+            <a:r>
+              <a:rPr lang="en-US" sz="2000" dirty="0"/>
+              <a:t> - 2017</a:t>
+            </a:r>
+          </a:p>
+        </p:txBody>
+      </p:sp>
+      <p:pic>
+        <p:nvPicPr>
+          <p:cNvPr id="8" name="Picture 7" descr="Diagram&#10;&#10;Description automatically generated">
+            <a:extLst>
+              <a:ext uri="{FF2B5EF4-FFF2-40B4-BE49-F238E27FC236}">
+                <a16:creationId xmlns:a16="http://schemas.microsoft.com/office/drawing/2014/main" id="{60ACAA40-694C-4ACF-AA28-423495A709C0}"/>
+              </a:ext>
+            </a:extLst>
+          </p:cNvPr>
+          <p:cNvPicPr>
+            <a:picLocks noChangeAspect="1"/>
+          </p:cNvPicPr>
+          <p:nvPr/>
+        </p:nvPicPr>
+        <p:blipFill>
+          <a:blip r:embed="rId4"/>
+          <a:stretch>
+            <a:fillRect/>
+          </a:stretch>
+        </p:blipFill>
+        <p:spPr>
+          <a:xfrm>
+            <a:off x="4059618" y="3683726"/>
+            <a:ext cx="4804771" cy="2525269"/>
+          </a:xfrm>
+          <a:prstGeom prst="rect">
+            <a:avLst/>
+          </a:prstGeom>
+        </p:spPr>
+      </p:pic>
     </p:spTree>
     <p:extLst>
       <p:ext uri="{BB962C8B-B14F-4D97-AF65-F5344CB8AC3E}">
-        <p14:creationId xmlns:p14="http://schemas.microsoft.com/office/powerpoint/2010/main" val="864860363"/>
+        <p14:creationId xmlns:p14="http://schemas.microsoft.com/office/powerpoint/2010/main" val="3714627232"/>
       </p:ext>
     </p:extLst>
   </p:cSld>
@@ -23163,14 +22488,12 @@
           </a:xfrm>
         </p:spPr>
         <p:txBody>
-          <a:bodyPr>
-            <a:normAutofit/>
-          </a:bodyPr>
+          <a:bodyPr/>
           <a:lstStyle/>
           <a:p>
             <a:r>
-              <a:rPr lang="en-US" sz="3200" dirty="0"/>
-              <a:t>Creating Features/Labels From Input Data</a:t>
+              <a:rPr lang="en-US" dirty="0"/>
+              <a:t>Proposal</a:t>
             </a:r>
           </a:p>
         </p:txBody>
@@ -23199,94 +22522,45 @@
         </p:spPr>
         <p:txBody>
           <a:bodyPr>
-            <a:normAutofit lnSpcReduction="10000"/>
+            <a:normAutofit/>
           </a:bodyPr>
           <a:lstStyle/>
           <a:p>
             <a:r>
               <a:rPr lang="en-US" sz="1800" dirty="0"/>
-              <a:t>Data available – 462,799 samples from a previous deployment of a network of nodes</a:t>
+              <a:t>Which feature measurements are necessary?</a:t>
             </a:r>
           </a:p>
           <a:p>
             <a:r>
               <a:rPr lang="en-US" sz="1800" dirty="0"/>
-              <a:t>Due to the use of cheap sensors some cleanup of the data was required</a:t>
+              <a:t>There might be some hidden relationships in the data that is collected, when machines are running many hazard will likely rise synchronously.</a:t>
+            </a:r>
+          </a:p>
+          <a:p>
+            <a:r>
+              <a:rPr lang="en-US" sz="1800" dirty="0"/>
+              <a:t>Could certain sensors be removed, and measurements accurately replaced by output from a deep learning model?</a:t>
+            </a:r>
+          </a:p>
+          <a:p>
+            <a:r>
+              <a:rPr lang="en-US" sz="1800" dirty="0"/>
+              <a:t>Main goals</a:t>
             </a:r>
           </a:p>
           <a:p>
             <a:pPr lvl="1"/>
             <a:r>
-              <a:rPr lang="en-US" sz="1600" dirty="0"/>
-              <a:t>All measurements that were 5*std away from the mean were replaced with the mean value</a:t>
-            </a:r>
-            <a:endParaRPr lang="en-US" sz="2000" dirty="0"/>
-          </a:p>
-          <a:p>
-            <a:r>
               <a:rPr lang="en-US" sz="1800" dirty="0"/>
-              <a:t>A sample consists of </a:t>
+              <a:t>Using data from past deployments of the air sensor network to train a model to predict sound levels from an input of time, VOC, CO, PM, Temp, and Humidity </a:t>
             </a:r>
           </a:p>
           <a:p>
             <a:pPr lvl="1"/>
             <a:r>
-              <a:rPr lang="en-US" sz="1600" dirty="0"/>
-              <a:t>Time of sample (Year, Month, Day, Hour, Minute, Second)</a:t>
-            </a:r>
-          </a:p>
-          <a:p>
-            <a:pPr lvl="1"/>
-            <a:r>
-              <a:rPr lang="en-US" sz="1600" dirty="0"/>
-              <a:t>VOC measurement</a:t>
-            </a:r>
-          </a:p>
-          <a:p>
-            <a:pPr lvl="1"/>
-            <a:r>
-              <a:rPr lang="en-US" sz="1600" dirty="0"/>
-              <a:t>CO2 measurement</a:t>
-            </a:r>
-          </a:p>
-          <a:p>
-            <a:pPr lvl="1"/>
-            <a:r>
-              <a:rPr lang="en-US" sz="1600" dirty="0"/>
-              <a:t>Temperature measurement</a:t>
-            </a:r>
-          </a:p>
-          <a:p>
-            <a:pPr lvl="1"/>
-            <a:r>
-              <a:rPr lang="en-US" sz="1600" dirty="0"/>
-              <a:t>PM measurement (1, 2.5 and 10)</a:t>
-            </a:r>
-          </a:p>
-          <a:p>
-            <a:pPr lvl="1"/>
-            <a:r>
-              <a:rPr lang="en-US" sz="1600" dirty="0"/>
-              <a:t>Sound level measurement</a:t>
-            </a:r>
-            <a:endParaRPr lang="en-US" sz="1800" dirty="0"/>
-          </a:p>
-          <a:p>
-            <a:r>
-              <a:rPr lang="en-US" sz="1800" dirty="0" err="1"/>
-              <a:t>Sklearn</a:t>
-            </a:r>
-            <a:r>
               <a:rPr lang="en-US" sz="1800" dirty="0"/>
-              <a:t> </a:t>
-            </a:r>
-            <a:r>
-              <a:rPr lang="en-US" sz="1800" dirty="0" err="1"/>
-              <a:t>StandardScaler</a:t>
-            </a:r>
-            <a:r>
-              <a:rPr lang="en-US" sz="1800" dirty="0"/>
-              <a:t> was used to scale all data</a:t>
+              <a:t>Train models using other features as labels to see if other hazards could be predicted using less sensor data as input</a:t>
             </a:r>
           </a:p>
         </p:txBody>
@@ -23294,7 +22568,7 @@
     </p:spTree>
     <p:extLst>
       <p:ext uri="{BB962C8B-B14F-4D97-AF65-F5344CB8AC3E}">
-        <p14:creationId xmlns:p14="http://schemas.microsoft.com/office/powerpoint/2010/main" val="3346755153"/>
+        <p14:creationId xmlns:p14="http://schemas.microsoft.com/office/powerpoint/2010/main" val="864860363"/>
       </p:ext>
     </p:extLst>
   </p:cSld>
@@ -23351,7 +22625,7 @@
           <a:p>
             <a:r>
               <a:rPr lang="en-US" sz="3200" dirty="0"/>
-              <a:t>Creating Features/Labels From Input Data</a:t>
+              <a:t>Data Available</a:t>
             </a:r>
           </a:p>
         </p:txBody>
@@ -23380,206 +22654,69 @@
         </p:spPr>
         <p:txBody>
           <a:bodyPr>
-            <a:normAutofit fontScale="92500" lnSpcReduction="10000"/>
+            <a:normAutofit/>
           </a:bodyPr>
           <a:lstStyle/>
           <a:p>
             <a:r>
               <a:rPr lang="en-US" sz="1800" dirty="0"/>
-              <a:t>Due to the use of cheap sensors some cleanup of the data was required</a:t>
+              <a:t>Data available – 462,799 samples from a previous deployment of a network of nodes</a:t>
+            </a:r>
+          </a:p>
+          <a:p>
+            <a:r>
+              <a:rPr lang="en-US" sz="1800" dirty="0"/>
+              <a:t>A sample consists of </a:t>
             </a:r>
           </a:p>
           <a:p>
             <a:pPr lvl="1"/>
             <a:r>
               <a:rPr lang="en-US" sz="1600" dirty="0"/>
-              <a:t>All measurements that were 5*std away from the mean were replaced with the mean value</a:t>
-            </a:r>
-          </a:p>
-          <a:p>
-            <a:r>
-              <a:rPr lang="en-US" sz="1800" dirty="0"/>
-              <a:t>With the goal of making the sample time feature appear cyclical to the model the time sample feature was replaced with a sin transform of the day of the week, hour and minute. </a:t>
+              <a:t>Time of sample (Year, Month, Day, Hour, Minute, Second)</a:t>
             </a:r>
           </a:p>
           <a:p>
             <a:pPr lvl="1"/>
             <a:r>
-              <a:rPr lang="en-US" sz="1400" dirty="0"/>
-              <a:t>Ex) </a:t>
-            </a:r>
-            <a:r>
-              <a:rPr lang="en-US" sz="1400" dirty="0" err="1"/>
-              <a:t>hour_transform</a:t>
-            </a:r>
-            <a:r>
-              <a:rPr lang="en-US" sz="1400" dirty="0"/>
-              <a:t> = sin(2</a:t>
-            </a:r>
-            <a:r>
-              <a:rPr lang="el-GR" sz="1400" dirty="0"/>
-              <a:t>π</a:t>
-            </a:r>
-            <a:r>
-              <a:rPr lang="en-US" sz="1400" dirty="0"/>
-              <a:t>(hour-0)/24)</a:t>
-            </a:r>
-          </a:p>
-          <a:p>
-            <a:r>
-              <a:rPr lang="en-US" sz="2000" dirty="0"/>
-              <a:t>Input feature</a:t>
+              <a:rPr lang="en-US" sz="1600" dirty="0"/>
+              <a:t>VOC measurement</a:t>
             </a:r>
           </a:p>
           <a:p>
             <a:pPr lvl="1"/>
             <a:r>
               <a:rPr lang="en-US" sz="1600" dirty="0"/>
-              <a:t>Sin transform of day of week</a:t>
+              <a:t>CO2 measurement</a:t>
             </a:r>
           </a:p>
           <a:p>
             <a:pPr lvl="1"/>
             <a:r>
               <a:rPr lang="en-US" sz="1600" dirty="0"/>
-              <a:t>Sin transform of hour</a:t>
+              <a:t>Temperature measurement</a:t>
             </a:r>
           </a:p>
           <a:p>
             <a:pPr lvl="1"/>
             <a:r>
               <a:rPr lang="en-US" sz="1600" dirty="0"/>
-              <a:t>Sin transform of minute</a:t>
+              <a:t>PM measurement (1, 2.5 and 10)</a:t>
             </a:r>
           </a:p>
           <a:p>
             <a:pPr lvl="1"/>
             <a:r>
               <a:rPr lang="en-US" sz="1600" dirty="0"/>
-              <a:t>PM (1, 2.5, 10)</a:t>
-            </a:r>
-          </a:p>
-          <a:p>
-            <a:pPr lvl="1"/>
-            <a:r>
-              <a:rPr lang="en-US" sz="1600" dirty="0"/>
-              <a:t>VOC</a:t>
-            </a:r>
-          </a:p>
-          <a:p>
-            <a:pPr lvl="1"/>
-            <a:r>
-              <a:rPr lang="en-US" sz="1600" dirty="0"/>
-              <a:t>Humidity</a:t>
-            </a:r>
-          </a:p>
-          <a:p>
-            <a:pPr lvl="1"/>
-            <a:r>
-              <a:rPr lang="en-US" sz="1600" dirty="0"/>
-              <a:t>Temperature</a:t>
-            </a:r>
-          </a:p>
-          <a:p>
-            <a:pPr lvl="1"/>
-            <a:endParaRPr lang="en-US" sz="1600" dirty="0"/>
-          </a:p>
-        </p:txBody>
-      </p:sp>
-      <p:sp>
-        <p:nvSpPr>
-          <p:cNvPr id="4" name="Arrow: Right 3">
-            <a:extLst>
-              <a:ext uri="{FF2B5EF4-FFF2-40B4-BE49-F238E27FC236}">
-                <a16:creationId xmlns:a16="http://schemas.microsoft.com/office/drawing/2014/main" id="{59A4C7AD-9AC4-4E9E-A5C3-85E6BB905575}"/>
-              </a:ext>
-            </a:extLst>
-          </p:cNvPr>
-          <p:cNvSpPr/>
-          <p:nvPr/>
-        </p:nvSpPr>
-        <p:spPr>
-          <a:xfrm>
-            <a:off x="4104860" y="4790660"/>
-            <a:ext cx="1262269" cy="258417"/>
-          </a:xfrm>
-          <a:prstGeom prst="rightArrow">
-            <a:avLst/>
-          </a:prstGeom>
-        </p:spPr>
-        <p:style>
-          <a:lnRef idx="2">
-            <a:schemeClr val="accent1">
-              <a:shade val="50000"/>
-            </a:schemeClr>
-          </a:lnRef>
-          <a:fillRef idx="1">
-            <a:schemeClr val="accent1"/>
-          </a:fillRef>
-          <a:effectRef idx="0">
-            <a:schemeClr val="accent1"/>
-          </a:effectRef>
-          <a:fontRef idx="minor">
-            <a:schemeClr val="lt1"/>
-          </a:fontRef>
-        </p:style>
-        <p:txBody>
-          <a:bodyPr rtlCol="0" anchor="ctr"/>
-          <a:lstStyle/>
-          <a:p>
-            <a:pPr algn="ctr"/>
-            <a:endParaRPr lang="en-US"/>
-          </a:p>
-        </p:txBody>
-      </p:sp>
-      <p:sp>
-        <p:nvSpPr>
-          <p:cNvPr id="5" name="TextBox 4">
-            <a:extLst>
-              <a:ext uri="{FF2B5EF4-FFF2-40B4-BE49-F238E27FC236}">
-                <a16:creationId xmlns:a16="http://schemas.microsoft.com/office/drawing/2014/main" id="{1E77D09D-0195-4620-98D5-2CEED363561A}"/>
-              </a:ext>
-            </a:extLst>
-          </p:cNvPr>
-          <p:cNvSpPr txBox="1"/>
-          <p:nvPr/>
-        </p:nvSpPr>
-        <p:spPr>
-          <a:xfrm>
-            <a:off x="5784575" y="4725911"/>
-            <a:ext cx="1779104" cy="646331"/>
-          </a:xfrm>
-          <a:prstGeom prst="rect">
-            <a:avLst/>
-          </a:prstGeom>
-          <a:noFill/>
-        </p:spPr>
-        <p:txBody>
-          <a:bodyPr wrap="square" rtlCol="0">
-            <a:spAutoFit/>
-          </a:bodyPr>
-          <a:lstStyle/>
-          <a:p>
-            <a:r>
-              <a:rPr lang="en-US" dirty="0">
-                <a:latin typeface="+mj-lt"/>
-              </a:rPr>
-              <a:t>Sound Level</a:t>
-            </a:r>
-          </a:p>
-          <a:p>
-            <a:pPr marL="285750" indent="-285750">
-              <a:buFont typeface="Arial" panose="020B0604020202020204" pitchFamily="34" charset="0"/>
-              <a:buChar char="•"/>
-            </a:pPr>
-            <a:endParaRPr lang="en-US" dirty="0"/>
+              <a:t>Sound level measurement</a:t>
+            </a:r>
           </a:p>
         </p:txBody>
       </p:sp>
     </p:spTree>
     <p:extLst>
       <p:ext uri="{BB962C8B-B14F-4D97-AF65-F5344CB8AC3E}">
-        <p14:creationId xmlns:p14="http://schemas.microsoft.com/office/powerpoint/2010/main" val="4089405275"/>
+        <p14:creationId xmlns:p14="http://schemas.microsoft.com/office/powerpoint/2010/main" val="3346755153"/>
       </p:ext>
     </p:extLst>
   </p:cSld>
@@ -23611,7 +22748,7 @@
           <p:cNvPr id="2" name="Title 1">
             <a:extLst>
               <a:ext uri="{FF2B5EF4-FFF2-40B4-BE49-F238E27FC236}">
-                <a16:creationId xmlns:a16="http://schemas.microsoft.com/office/drawing/2014/main" id="{8B3A5790-572F-4E04-BFC6-AA053FA29304}"/>
+                <a16:creationId xmlns:a16="http://schemas.microsoft.com/office/drawing/2014/main" id="{95370379-2B8A-42C0-8174-A22B7008B144}"/>
               </a:ext>
             </a:extLst>
           </p:cNvPr>
@@ -23622,141 +22759,254 @@
             <p:ph type="title"/>
           </p:nvPr>
         </p:nvSpPr>
-        <p:spPr/>
-        <p:txBody>
-          <a:bodyPr/>
+        <p:spPr>
+          <a:xfrm>
+            <a:off x="714375" y="389510"/>
+            <a:ext cx="7715250" cy="1331865"/>
+          </a:xfrm>
+        </p:spPr>
+        <p:txBody>
+          <a:bodyPr>
+            <a:normAutofit/>
+          </a:bodyPr>
           <a:lstStyle/>
           <a:p>
             <a:r>
-              <a:rPr lang="en-US" dirty="0"/>
-              <a:t>Input Data</a:t>
-            </a:r>
-          </a:p>
-        </p:txBody>
-      </p:sp>
-      <p:pic>
-        <p:nvPicPr>
-          <p:cNvPr id="5" name="Content Placeholder 4">
-            <a:extLst>
-              <a:ext uri="{FF2B5EF4-FFF2-40B4-BE49-F238E27FC236}">
-                <a16:creationId xmlns:a16="http://schemas.microsoft.com/office/drawing/2014/main" id="{325FDBFD-7A55-457D-AED8-8CA862C88DE8}"/>
-              </a:ext>
-            </a:extLst>
-          </p:cNvPr>
-          <p:cNvPicPr>
-            <a:picLocks noGrp="1" noChangeAspect="1"/>
-          </p:cNvPicPr>
+              <a:rPr lang="en-US" sz="3200" dirty="0"/>
+              <a:t>Creating Features/Labels From Data</a:t>
+            </a:r>
+          </a:p>
+        </p:txBody>
+      </p:sp>
+      <p:sp>
+        <p:nvSpPr>
+          <p:cNvPr id="3" name="Content Placeholder 2">
+            <a:extLst>
+              <a:ext uri="{FF2B5EF4-FFF2-40B4-BE49-F238E27FC236}">
+                <a16:creationId xmlns:a16="http://schemas.microsoft.com/office/drawing/2014/main" id="{AEDCB975-6DEE-435D-BD89-3610736237D1}"/>
+              </a:ext>
+            </a:extLst>
+          </p:cNvPr>
+          <p:cNvSpPr>
+            <a:spLocks noGrp="1"/>
+          </p:cNvSpPr>
           <p:nvPr>
             <p:ph idx="1"/>
           </p:nvPr>
-        </p:nvPicPr>
-        <p:blipFill>
-          <a:blip r:embed="rId2"/>
-          <a:stretch>
-            <a:fillRect/>
-          </a:stretch>
-        </p:blipFill>
-        <p:spPr>
-          <a:xfrm>
-            <a:off x="548207" y="1780975"/>
-            <a:ext cx="3552825" cy="2286000"/>
-          </a:xfrm>
-        </p:spPr>
-      </p:pic>
-      <p:pic>
-        <p:nvPicPr>
-          <p:cNvPr id="7" name="Picture 6">
-            <a:extLst>
-              <a:ext uri="{FF2B5EF4-FFF2-40B4-BE49-F238E27FC236}">
-                <a16:creationId xmlns:a16="http://schemas.microsoft.com/office/drawing/2014/main" id="{33514A45-90E9-43A9-AC68-1DA883ED5A15}"/>
-              </a:ext>
-            </a:extLst>
-          </p:cNvPr>
-          <p:cNvPicPr>
-            <a:picLocks noChangeAspect="1"/>
-          </p:cNvPicPr>
+        </p:nvSpPr>
+        <p:spPr>
+          <a:xfrm>
+            <a:off x="714375" y="2050741"/>
+            <a:ext cx="7715250" cy="3892859"/>
+          </a:xfrm>
+        </p:spPr>
+        <p:txBody>
+          <a:bodyPr>
+            <a:normAutofit lnSpcReduction="10000"/>
+          </a:bodyPr>
+          <a:lstStyle/>
+          <a:p>
+            <a:r>
+              <a:rPr lang="en-US" sz="1800" dirty="0"/>
+              <a:t>With the goal of making the sample time feature appear cyclical to the model the time sample feature was replaced with a sin transform of the day of the week, hour and minute. </a:t>
+            </a:r>
+          </a:p>
+          <a:p>
+            <a:pPr lvl="1"/>
+            <a:r>
+              <a:rPr lang="en-US" sz="1400" dirty="0"/>
+              <a:t>Ex) </a:t>
+            </a:r>
+            <a:r>
+              <a:rPr lang="en-US" sz="1400" dirty="0" err="1"/>
+              <a:t>hour_transform</a:t>
+            </a:r>
+            <a:r>
+              <a:rPr lang="en-US" sz="1400" dirty="0"/>
+              <a:t> = sin(2</a:t>
+            </a:r>
+            <a:r>
+              <a:rPr lang="el-GR" sz="1400" dirty="0"/>
+              <a:t>π</a:t>
+            </a:r>
+            <a:r>
+              <a:rPr lang="en-US" sz="1400" dirty="0"/>
+              <a:t>(hour-0)/24)</a:t>
+            </a:r>
+          </a:p>
+          <a:p>
+            <a:r>
+              <a:rPr lang="en-US" sz="1800" dirty="0" err="1"/>
+              <a:t>Sklearn</a:t>
+            </a:r>
+            <a:r>
+              <a:rPr lang="en-US" sz="1800" dirty="0"/>
+              <a:t> </a:t>
+            </a:r>
+            <a:r>
+              <a:rPr lang="en-US" sz="1800" dirty="0" err="1"/>
+              <a:t>StandardScaler</a:t>
+            </a:r>
+            <a:r>
+              <a:rPr lang="en-US" sz="1800" dirty="0"/>
+              <a:t> was used to scale all data</a:t>
+            </a:r>
+          </a:p>
+          <a:p>
+            <a:r>
+              <a:rPr lang="en-US" sz="1800" dirty="0"/>
+              <a:t>Input feature</a:t>
+            </a:r>
+          </a:p>
+          <a:p>
+            <a:pPr lvl="1"/>
+            <a:r>
+              <a:rPr lang="en-US" sz="1600" dirty="0"/>
+              <a:t>Sin transform of day of week</a:t>
+            </a:r>
+          </a:p>
+          <a:p>
+            <a:pPr lvl="1"/>
+            <a:r>
+              <a:rPr lang="en-US" sz="1600" dirty="0"/>
+              <a:t>Sin transform of hour</a:t>
+            </a:r>
+          </a:p>
+          <a:p>
+            <a:pPr lvl="1"/>
+            <a:r>
+              <a:rPr lang="en-US" sz="1600" dirty="0"/>
+              <a:t>Sin transform of minute</a:t>
+            </a:r>
+          </a:p>
+          <a:p>
+            <a:pPr lvl="1"/>
+            <a:r>
+              <a:rPr lang="en-US" sz="1600" dirty="0"/>
+              <a:t>PM (1, 2.5, 10)</a:t>
+            </a:r>
+          </a:p>
+          <a:p>
+            <a:pPr lvl="1"/>
+            <a:r>
+              <a:rPr lang="en-US" sz="1600" dirty="0"/>
+              <a:t>VOC</a:t>
+            </a:r>
+          </a:p>
+          <a:p>
+            <a:pPr lvl="1"/>
+            <a:r>
+              <a:rPr lang="en-US" sz="1600" dirty="0"/>
+              <a:t>Humidity</a:t>
+            </a:r>
+          </a:p>
+          <a:p>
+            <a:pPr lvl="1"/>
+            <a:r>
+              <a:rPr lang="en-US" sz="1600" dirty="0"/>
+              <a:t>Temperature</a:t>
+            </a:r>
+          </a:p>
+          <a:p>
+            <a:pPr lvl="1"/>
+            <a:endParaRPr lang="en-US" sz="1600" dirty="0"/>
+          </a:p>
+        </p:txBody>
+      </p:sp>
+      <p:sp>
+        <p:nvSpPr>
+          <p:cNvPr id="4" name="Arrow: Right 3">
+            <a:extLst>
+              <a:ext uri="{FF2B5EF4-FFF2-40B4-BE49-F238E27FC236}">
+                <a16:creationId xmlns:a16="http://schemas.microsoft.com/office/drawing/2014/main" id="{59A4C7AD-9AC4-4E9E-A5C3-85E6BB905575}"/>
+              </a:ext>
+            </a:extLst>
+          </p:cNvPr>
+          <p:cNvSpPr/>
           <p:nvPr/>
-        </p:nvPicPr>
-        <p:blipFill>
-          <a:blip r:embed="rId3"/>
-          <a:stretch>
-            <a:fillRect/>
-          </a:stretch>
-        </p:blipFill>
-        <p:spPr>
-          <a:xfrm>
-            <a:off x="4876799" y="1780975"/>
-            <a:ext cx="3552826" cy="2283960"/>
+        </p:nvSpPr>
+        <p:spPr>
+          <a:xfrm>
+            <a:off x="4104860" y="4532243"/>
+            <a:ext cx="1262269" cy="258417"/>
+          </a:xfrm>
+          <a:prstGeom prst="rightArrow">
+            <a:avLst/>
+          </a:prstGeom>
+        </p:spPr>
+        <p:style>
+          <a:lnRef idx="2">
+            <a:schemeClr val="accent1">
+              <a:shade val="50000"/>
+            </a:schemeClr>
+          </a:lnRef>
+          <a:fillRef idx="1">
+            <a:schemeClr val="accent1"/>
+          </a:fillRef>
+          <a:effectRef idx="0">
+            <a:schemeClr val="accent1"/>
+          </a:effectRef>
+          <a:fontRef idx="minor">
+            <a:schemeClr val="lt1"/>
+          </a:fontRef>
+        </p:style>
+        <p:txBody>
+          <a:bodyPr rtlCol="0" anchor="ctr"/>
+          <a:lstStyle/>
+          <a:p>
+            <a:pPr algn="ctr"/>
+            <a:endParaRPr lang="en-US"/>
+          </a:p>
+        </p:txBody>
+      </p:sp>
+      <p:sp>
+        <p:nvSpPr>
+          <p:cNvPr id="5" name="TextBox 4">
+            <a:extLst>
+              <a:ext uri="{FF2B5EF4-FFF2-40B4-BE49-F238E27FC236}">
+                <a16:creationId xmlns:a16="http://schemas.microsoft.com/office/drawing/2014/main" id="{1E77D09D-0195-4620-98D5-2CEED363561A}"/>
+              </a:ext>
+            </a:extLst>
+          </p:cNvPr>
+          <p:cNvSpPr txBox="1"/>
+          <p:nvPr/>
+        </p:nvSpPr>
+        <p:spPr>
+          <a:xfrm>
+            <a:off x="5784575" y="4467494"/>
+            <a:ext cx="1779104" cy="646331"/>
           </a:xfrm>
           <a:prstGeom prst="rect">
             <a:avLst/>
           </a:prstGeom>
-        </p:spPr>
-      </p:pic>
-      <p:pic>
-        <p:nvPicPr>
-          <p:cNvPr id="9" name="Picture 8">
-            <a:extLst>
-              <a:ext uri="{FF2B5EF4-FFF2-40B4-BE49-F238E27FC236}">
-                <a16:creationId xmlns:a16="http://schemas.microsoft.com/office/drawing/2014/main" id="{9C94075B-93D9-40E8-927C-73481C90D159}"/>
-              </a:ext>
-            </a:extLst>
-          </p:cNvPr>
-          <p:cNvPicPr>
-            <a:picLocks noChangeAspect="1"/>
-          </p:cNvPicPr>
-          <p:nvPr/>
-        </p:nvPicPr>
-        <p:blipFill>
-          <a:blip r:embed="rId4"/>
-          <a:stretch>
-            <a:fillRect/>
-          </a:stretch>
-        </p:blipFill>
-        <p:spPr>
-          <a:xfrm>
-            <a:off x="714375" y="4064935"/>
-            <a:ext cx="3399065" cy="2238182"/>
-          </a:xfrm>
-          <a:prstGeom prst="rect">
-            <a:avLst/>
-          </a:prstGeom>
-        </p:spPr>
-      </p:pic>
-      <p:pic>
-        <p:nvPicPr>
-          <p:cNvPr id="11" name="Picture 10">
-            <a:extLst>
-              <a:ext uri="{FF2B5EF4-FFF2-40B4-BE49-F238E27FC236}">
-                <a16:creationId xmlns:a16="http://schemas.microsoft.com/office/drawing/2014/main" id="{51CF6F16-E176-49A4-84B7-704A0621C4BB}"/>
-              </a:ext>
-            </a:extLst>
-          </p:cNvPr>
-          <p:cNvPicPr>
-            <a:picLocks noChangeAspect="1"/>
-          </p:cNvPicPr>
-          <p:nvPr/>
-        </p:nvPicPr>
-        <p:blipFill>
-          <a:blip r:embed="rId5"/>
-          <a:stretch>
-            <a:fillRect/>
-          </a:stretch>
-        </p:blipFill>
-        <p:spPr>
-          <a:xfrm>
-            <a:off x="5087711" y="4096863"/>
-            <a:ext cx="3399065" cy="2206253"/>
-          </a:xfrm>
-          <a:prstGeom prst="rect">
-            <a:avLst/>
-          </a:prstGeom>
-        </p:spPr>
-      </p:pic>
+          <a:noFill/>
+        </p:spPr>
+        <p:txBody>
+          <a:bodyPr wrap="square" rtlCol="0">
+            <a:spAutoFit/>
+          </a:bodyPr>
+          <a:lstStyle/>
+          <a:p>
+            <a:r>
+              <a:rPr lang="en-US" dirty="0">
+                <a:latin typeface="+mj-lt"/>
+              </a:rPr>
+              <a:t>Sound Level</a:t>
+            </a:r>
+          </a:p>
+          <a:p>
+            <a:pPr marL="285750" indent="-285750">
+              <a:buFont typeface="Arial" panose="020B0604020202020204" pitchFamily="34" charset="0"/>
+              <a:buChar char="•"/>
+            </a:pPr>
+            <a:endParaRPr lang="en-US" dirty="0"/>
+          </a:p>
+        </p:txBody>
+      </p:sp>
     </p:spTree>
     <p:extLst>
       <p:ext uri="{BB962C8B-B14F-4D97-AF65-F5344CB8AC3E}">
-        <p14:creationId xmlns:p14="http://schemas.microsoft.com/office/powerpoint/2010/main" val="2060934359"/>
+        <p14:creationId xmlns:p14="http://schemas.microsoft.com/office/powerpoint/2010/main" val="4089405275"/>
       </p:ext>
     </p:extLst>
   </p:cSld>
@@ -23813,17 +23063,19 @@
       </p:sp>
       <p:pic>
         <p:nvPicPr>
-          <p:cNvPr id="8" name="Picture 7">
-            <a:extLst>
-              <a:ext uri="{FF2B5EF4-FFF2-40B4-BE49-F238E27FC236}">
-                <a16:creationId xmlns:a16="http://schemas.microsoft.com/office/drawing/2014/main" id="{AA280BA4-4060-4BB4-97FC-A767BE93DC18}"/>
+          <p:cNvPr id="5" name="Content Placeholder 4">
+            <a:extLst>
+              <a:ext uri="{FF2B5EF4-FFF2-40B4-BE49-F238E27FC236}">
+                <a16:creationId xmlns:a16="http://schemas.microsoft.com/office/drawing/2014/main" id="{325FDBFD-7A55-457D-AED8-8CA862C88DE8}"/>
               </a:ext>
             </a:extLst>
           </p:cNvPr>
           <p:cNvPicPr>
-            <a:picLocks noChangeAspect="1"/>
+            <a:picLocks noGrp="1" noChangeAspect="1"/>
           </p:cNvPicPr>
-          <p:nvPr/>
+          <p:nvPr>
+            <p:ph idx="1"/>
+          </p:nvPr>
         </p:nvPicPr>
         <p:blipFill>
           <a:blip r:embed="rId2"/>
@@ -23833,20 +23085,17 @@
         </p:blipFill>
         <p:spPr>
           <a:xfrm>
-            <a:off x="544150" y="1753675"/>
-            <a:ext cx="3348581" cy="2232387"/>
-          </a:xfrm>
-          <a:prstGeom prst="rect">
-            <a:avLst/>
-          </a:prstGeom>
+            <a:off x="548207" y="1780975"/>
+            <a:ext cx="3552825" cy="2286000"/>
+          </a:xfrm>
         </p:spPr>
       </p:pic>
       <p:pic>
         <p:nvPicPr>
-          <p:cNvPr id="12" name="Picture 11">
-            <a:extLst>
-              <a:ext uri="{FF2B5EF4-FFF2-40B4-BE49-F238E27FC236}">
-                <a16:creationId xmlns:a16="http://schemas.microsoft.com/office/drawing/2014/main" id="{12999FFA-AB3D-4ED6-B355-7E89065DCC3E}"/>
+          <p:cNvPr id="7" name="Picture 6">
+            <a:extLst>
+              <a:ext uri="{FF2B5EF4-FFF2-40B4-BE49-F238E27FC236}">
+                <a16:creationId xmlns:a16="http://schemas.microsoft.com/office/drawing/2014/main" id="{33514A45-90E9-43A9-AC68-1DA883ED5A15}"/>
               </a:ext>
             </a:extLst>
           </p:cNvPr>
@@ -23863,8 +23112,8 @@
         </p:blipFill>
         <p:spPr>
           <a:xfrm>
-            <a:off x="4953000" y="1753675"/>
-            <a:ext cx="3476625" cy="2314575"/>
+            <a:off x="4876799" y="1780975"/>
+            <a:ext cx="3552826" cy="2283960"/>
           </a:xfrm>
           <a:prstGeom prst="rect">
             <a:avLst/>
@@ -23873,10 +23122,10 @@
       </p:pic>
       <p:pic>
         <p:nvPicPr>
-          <p:cNvPr id="14" name="Picture 13">
-            <a:extLst>
-              <a:ext uri="{FF2B5EF4-FFF2-40B4-BE49-F238E27FC236}">
-                <a16:creationId xmlns:a16="http://schemas.microsoft.com/office/drawing/2014/main" id="{C44BF9B7-D00E-4977-AE16-27DFDD13F4A5}"/>
+          <p:cNvPr id="9" name="Picture 8">
+            <a:extLst>
+              <a:ext uri="{FF2B5EF4-FFF2-40B4-BE49-F238E27FC236}">
+                <a16:creationId xmlns:a16="http://schemas.microsoft.com/office/drawing/2014/main" id="{9C94075B-93D9-40E8-927C-73481C90D159}"/>
               </a:ext>
             </a:extLst>
           </p:cNvPr>
@@ -23893,8 +23142,8 @@
         </p:blipFill>
         <p:spPr>
           <a:xfrm>
-            <a:off x="614906" y="3986062"/>
-            <a:ext cx="3277825" cy="2236527"/>
+            <a:off x="714375" y="4064935"/>
+            <a:ext cx="3399065" cy="2238182"/>
           </a:xfrm>
           <a:prstGeom prst="rect">
             <a:avLst/>
@@ -23903,10 +23152,10 @@
       </p:pic>
       <p:pic>
         <p:nvPicPr>
-          <p:cNvPr id="16" name="Picture 15">
-            <a:extLst>
-              <a:ext uri="{FF2B5EF4-FFF2-40B4-BE49-F238E27FC236}">
-                <a16:creationId xmlns:a16="http://schemas.microsoft.com/office/drawing/2014/main" id="{F8B065A0-CA7E-4CF1-8EDE-B6223A1EEC32}"/>
+          <p:cNvPr id="11" name="Picture 10">
+            <a:extLst>
+              <a:ext uri="{FF2B5EF4-FFF2-40B4-BE49-F238E27FC236}">
+                <a16:creationId xmlns:a16="http://schemas.microsoft.com/office/drawing/2014/main" id="{51CF6F16-E176-49A4-84B7-704A0621C4BB}"/>
               </a:ext>
             </a:extLst>
           </p:cNvPr>
@@ -23923,8 +23172,8 @@
         </p:blipFill>
         <p:spPr>
           <a:xfrm>
-            <a:off x="5052470" y="4068250"/>
-            <a:ext cx="3377156" cy="2220847"/>
+            <a:off x="5087711" y="4096863"/>
+            <a:ext cx="3399065" cy="2206253"/>
           </a:xfrm>
           <a:prstGeom prst="rect">
             <a:avLst/>
@@ -23934,7 +23183,7 @@
     </p:spTree>
     <p:extLst>
       <p:ext uri="{BB962C8B-B14F-4D97-AF65-F5344CB8AC3E}">
-        <p14:creationId xmlns:p14="http://schemas.microsoft.com/office/powerpoint/2010/main" val="2034000303"/>
+        <p14:creationId xmlns:p14="http://schemas.microsoft.com/office/powerpoint/2010/main" val="2060934359"/>
       </p:ext>
     </p:extLst>
   </p:cSld>
@@ -23966,7 +23215,7 @@
           <p:cNvPr id="2" name="Title 1">
             <a:extLst>
               <a:ext uri="{FF2B5EF4-FFF2-40B4-BE49-F238E27FC236}">
-                <a16:creationId xmlns:a16="http://schemas.microsoft.com/office/drawing/2014/main" id="{7935CBB2-F610-40B4-A124-363EF63EBDD4}"/>
+                <a16:creationId xmlns:a16="http://schemas.microsoft.com/office/drawing/2014/main" id="{8B3A5790-572F-4E04-BFC6-AA053FA29304}"/>
               </a:ext>
             </a:extLst>
           </p:cNvPr>
@@ -23977,134 +23226,142 @@
             <p:ph type="title"/>
           </p:nvPr>
         </p:nvSpPr>
-        <p:spPr>
-          <a:xfrm>
-            <a:off x="714375" y="526778"/>
-            <a:ext cx="7715251" cy="869089"/>
-          </a:xfrm>
-        </p:spPr>
+        <p:spPr/>
         <p:txBody>
           <a:bodyPr/>
           <a:lstStyle/>
           <a:p>
             <a:r>
               <a:rPr lang="en-US" dirty="0"/>
-              <a:t>Testing / Validation plan</a:t>
-            </a:r>
-          </a:p>
-        </p:txBody>
-      </p:sp>
-      <p:sp>
-        <p:nvSpPr>
-          <p:cNvPr id="3" name="Content Placeholder 2">
-            <a:extLst>
-              <a:ext uri="{FF2B5EF4-FFF2-40B4-BE49-F238E27FC236}">
-                <a16:creationId xmlns:a16="http://schemas.microsoft.com/office/drawing/2014/main" id="{9113FCDE-F6D7-41FF-9845-D3893750EB08}"/>
-              </a:ext>
-            </a:extLst>
-          </p:cNvPr>
-          <p:cNvSpPr>
-            <a:spLocks noGrp="1"/>
-          </p:cNvSpPr>
-          <p:nvPr>
-            <p:ph idx="10"/>
-          </p:nvPr>
-        </p:nvSpPr>
-        <p:spPr>
-          <a:xfrm>
-            <a:off x="714374" y="1686758"/>
-            <a:ext cx="7688645" cy="4256843"/>
-          </a:xfrm>
-        </p:spPr>
-        <p:txBody>
-          <a:bodyPr>
-            <a:normAutofit/>
-          </a:bodyPr>
-          <a:lstStyle/>
-          <a:p>
-            <a:r>
-              <a:rPr lang="en-US" sz="2000" dirty="0"/>
-              <a:t>Using the </a:t>
-            </a:r>
-            <a:r>
-              <a:rPr lang="en-US" sz="2000" dirty="0" err="1"/>
-              <a:t>sklearn</a:t>
-            </a:r>
-            <a:r>
-              <a:rPr lang="en-US" sz="2000" dirty="0"/>
-              <a:t> </a:t>
-            </a:r>
-            <a:r>
-              <a:rPr lang="en-US" sz="2000" dirty="0" err="1"/>
-              <a:t>train_test_split</a:t>
-            </a:r>
-            <a:r>
-              <a:rPr lang="en-US" sz="2000" dirty="0"/>
-              <a:t> function the data was first split into test/train data with a split of 80% train, 20% test.</a:t>
-            </a:r>
-          </a:p>
-          <a:p>
-            <a:r>
-              <a:rPr lang="en-US" sz="2000" dirty="0"/>
-              <a:t>The </a:t>
-            </a:r>
-            <a:r>
-              <a:rPr lang="en-US" sz="2000" dirty="0" err="1"/>
-              <a:t>train_test_split</a:t>
-            </a:r>
-            <a:r>
-              <a:rPr lang="en-US" sz="2000" dirty="0"/>
-              <a:t> function was then used again on the train data to generate validation data with a split of 80% train, 20% validation</a:t>
-            </a:r>
-          </a:p>
-          <a:p>
-            <a:r>
-              <a:rPr lang="en-US" sz="2000" dirty="0"/>
-              <a:t>Validation data was used to evaluate performance during training, test data was used to evaluate the model after training was </a:t>
-            </a:r>
-            <a:r>
-              <a:rPr lang="en-US" sz="2000" dirty="0" err="1"/>
-              <a:t>comlpete</a:t>
-            </a:r>
-            <a:endParaRPr lang="en-US" sz="2000" dirty="0"/>
-          </a:p>
-          <a:p>
-            <a:r>
-              <a:rPr lang="en-US" sz="2000" dirty="0"/>
-              <a:t>This resulted in a split of</a:t>
-            </a:r>
-          </a:p>
-          <a:p>
-            <a:pPr lvl="1"/>
-            <a:r>
-              <a:rPr lang="en-US" sz="1600" dirty="0"/>
-              <a:t>64% training data</a:t>
-            </a:r>
-          </a:p>
-          <a:p>
-            <a:pPr lvl="1"/>
-            <a:r>
-              <a:rPr lang="en-US" sz="1600" dirty="0"/>
-              <a:t>20% testing data</a:t>
-            </a:r>
-          </a:p>
-          <a:p>
-            <a:pPr lvl="1"/>
-            <a:r>
-              <a:rPr lang="en-US" sz="1600" dirty="0"/>
-              <a:t>16% validation data</a:t>
-            </a:r>
-          </a:p>
-          <a:p>
-            <a:pPr lvl="1"/>
-            <a:endParaRPr lang="en-US" sz="1600" dirty="0"/>
-          </a:p>
-        </p:txBody>
-      </p:sp>
+              <a:t>Input Data</a:t>
+            </a:r>
+          </a:p>
+        </p:txBody>
+      </p:sp>
+      <p:pic>
+        <p:nvPicPr>
+          <p:cNvPr id="8" name="Picture 7">
+            <a:extLst>
+              <a:ext uri="{FF2B5EF4-FFF2-40B4-BE49-F238E27FC236}">
+                <a16:creationId xmlns:a16="http://schemas.microsoft.com/office/drawing/2014/main" id="{AA280BA4-4060-4BB4-97FC-A767BE93DC18}"/>
+              </a:ext>
+            </a:extLst>
+          </p:cNvPr>
+          <p:cNvPicPr>
+            <a:picLocks noChangeAspect="1"/>
+          </p:cNvPicPr>
+          <p:nvPr/>
+        </p:nvPicPr>
+        <p:blipFill>
+          <a:blip r:embed="rId2"/>
+          <a:stretch>
+            <a:fillRect/>
+          </a:stretch>
+        </p:blipFill>
+        <p:spPr>
+          <a:xfrm>
+            <a:off x="544150" y="1753675"/>
+            <a:ext cx="3348581" cy="2232387"/>
+          </a:xfrm>
+          <a:prstGeom prst="rect">
+            <a:avLst/>
+          </a:prstGeom>
+        </p:spPr>
+      </p:pic>
+      <p:pic>
+        <p:nvPicPr>
+          <p:cNvPr id="12" name="Picture 11">
+            <a:extLst>
+              <a:ext uri="{FF2B5EF4-FFF2-40B4-BE49-F238E27FC236}">
+                <a16:creationId xmlns:a16="http://schemas.microsoft.com/office/drawing/2014/main" id="{12999FFA-AB3D-4ED6-B355-7E89065DCC3E}"/>
+              </a:ext>
+            </a:extLst>
+          </p:cNvPr>
+          <p:cNvPicPr>
+            <a:picLocks noChangeAspect="1"/>
+          </p:cNvPicPr>
+          <p:nvPr/>
+        </p:nvPicPr>
+        <p:blipFill>
+          <a:blip r:embed="rId3"/>
+          <a:stretch>
+            <a:fillRect/>
+          </a:stretch>
+        </p:blipFill>
+        <p:spPr>
+          <a:xfrm>
+            <a:off x="4953000" y="1753675"/>
+            <a:ext cx="3476625" cy="2314575"/>
+          </a:xfrm>
+          <a:prstGeom prst="rect">
+            <a:avLst/>
+          </a:prstGeom>
+        </p:spPr>
+      </p:pic>
+      <p:pic>
+        <p:nvPicPr>
+          <p:cNvPr id="14" name="Picture 13">
+            <a:extLst>
+              <a:ext uri="{FF2B5EF4-FFF2-40B4-BE49-F238E27FC236}">
+                <a16:creationId xmlns:a16="http://schemas.microsoft.com/office/drawing/2014/main" id="{C44BF9B7-D00E-4977-AE16-27DFDD13F4A5}"/>
+              </a:ext>
+            </a:extLst>
+          </p:cNvPr>
+          <p:cNvPicPr>
+            <a:picLocks noChangeAspect="1"/>
+          </p:cNvPicPr>
+          <p:nvPr/>
+        </p:nvPicPr>
+        <p:blipFill>
+          <a:blip r:embed="rId4"/>
+          <a:stretch>
+            <a:fillRect/>
+          </a:stretch>
+        </p:blipFill>
+        <p:spPr>
+          <a:xfrm>
+            <a:off x="614906" y="3986062"/>
+            <a:ext cx="3277825" cy="2236527"/>
+          </a:xfrm>
+          <a:prstGeom prst="rect">
+            <a:avLst/>
+          </a:prstGeom>
+        </p:spPr>
+      </p:pic>
+      <p:pic>
+        <p:nvPicPr>
+          <p:cNvPr id="16" name="Picture 15">
+            <a:extLst>
+              <a:ext uri="{FF2B5EF4-FFF2-40B4-BE49-F238E27FC236}">
+                <a16:creationId xmlns:a16="http://schemas.microsoft.com/office/drawing/2014/main" id="{F8B065A0-CA7E-4CF1-8EDE-B6223A1EEC32}"/>
+              </a:ext>
+            </a:extLst>
+          </p:cNvPr>
+          <p:cNvPicPr>
+            <a:picLocks noChangeAspect="1"/>
+          </p:cNvPicPr>
+          <p:nvPr/>
+        </p:nvPicPr>
+        <p:blipFill>
+          <a:blip r:embed="rId5"/>
+          <a:stretch>
+            <a:fillRect/>
+          </a:stretch>
+        </p:blipFill>
+        <p:spPr>
+          <a:xfrm>
+            <a:off x="5052470" y="4068250"/>
+            <a:ext cx="3377156" cy="2220847"/>
+          </a:xfrm>
+          <a:prstGeom prst="rect">
+            <a:avLst/>
+          </a:prstGeom>
+        </p:spPr>
+      </p:pic>
     </p:spTree>
     <p:extLst>
       <p:ext uri="{BB962C8B-B14F-4D97-AF65-F5344CB8AC3E}">
-        <p14:creationId xmlns:p14="http://schemas.microsoft.com/office/powerpoint/2010/main" val="3743522566"/>
+        <p14:creationId xmlns:p14="http://schemas.microsoft.com/office/powerpoint/2010/main" val="2034000303"/>
       </p:ext>
     </p:extLst>
   </p:cSld>
@@ -24906,18 +24163,18 @@
 </file>
 
 <file path=customXml/item1.xml><?xml version="1.0" encoding="utf-8"?>
+<p:properties xmlns:p="http://schemas.microsoft.com/office/2006/metadata/properties" xmlns:xsi="http://www.w3.org/2001/XMLSchema-instance" xmlns:pc="http://schemas.microsoft.com/office/infopath/2007/PartnerControls">
+  <documentManagement/>
+</p:properties>
+</file>
+
+<file path=customXml/item2.xml><?xml version="1.0" encoding="utf-8"?>
 <?mso-contentType ?>
 <FormTemplates xmlns="http://schemas.microsoft.com/sharepoint/v3/contenttype/forms">
   <Display>DocumentLibraryForm</Display>
   <Edit>DocumentLibraryForm</Edit>
   <New>DocumentLibraryForm</New>
 </FormTemplates>
-</file>
-
-<file path=customXml/item2.xml><?xml version="1.0" encoding="utf-8"?>
-<p:properties xmlns:p="http://schemas.microsoft.com/office/2006/metadata/properties" xmlns:xsi="http://www.w3.org/2001/XMLSchema-instance" xmlns:pc="http://schemas.microsoft.com/office/infopath/2007/PartnerControls">
-  <documentManagement/>
-</p:properties>
 </file>
 
 <file path=customXml/item3.xml><?xml version="1.0" encoding="utf-8"?>
@@ -25035,14 +24292,6 @@
 </file>
 
 <file path=customXml/itemProps1.xml><?xml version="1.0" encoding="utf-8"?>
-<ds:datastoreItem xmlns:ds="http://schemas.openxmlformats.org/officeDocument/2006/customXml" ds:itemID="{A14B8143-C3D6-460D-830C-A8DBEE85511A}">
-  <ds:schemaRefs>
-    <ds:schemaRef ds:uri="http://schemas.microsoft.com/sharepoint/v3/contenttype/forms"/>
-  </ds:schemaRefs>
-</ds:datastoreItem>
-</file>
-
-<file path=customXml/itemProps2.xml><?xml version="1.0" encoding="utf-8"?>
 <ds:datastoreItem xmlns:ds="http://schemas.openxmlformats.org/officeDocument/2006/customXml" ds:itemID="{097FFD54-27B0-415C-8654-D843242BD071}">
   <ds:schemaRefs>
     <ds:schemaRef ds:uri="http://schemas.microsoft.com/office/2006/documentManagement/types"/>
@@ -25053,6 +24302,14 @@
     <ds:schemaRef ds:uri="http://purl.org/dc/elements/1.1/"/>
     <ds:schemaRef ds:uri="http://www.w3.org/XML/1998/namespace"/>
     <ds:schemaRef ds:uri="http://schemas.microsoft.com/office/2006/metadata/properties"/>
+  </ds:schemaRefs>
+</ds:datastoreItem>
+</file>
+
+<file path=customXml/itemProps2.xml><?xml version="1.0" encoding="utf-8"?>
+<ds:datastoreItem xmlns:ds="http://schemas.openxmlformats.org/officeDocument/2006/customXml" ds:itemID="{A14B8143-C3D6-460D-830C-A8DBEE85511A}">
+  <ds:schemaRefs>
+    <ds:schemaRef ds:uri="http://schemas.microsoft.com/sharepoint/v3/contenttype/forms"/>
   </ds:schemaRefs>
 </ds:datastoreItem>
 </file>

</xml_diff>